<commit_message>
:memo: Update presentaion, update completion options
</commit_message>
<xml_diff>
--- a/docs/YARC.pptx
+++ b/docs/YARC.pptx
@@ -214,7 +214,7 @@
           <a:p>
             <a:fld id="{C2D80E68-D96B-4CC5-9429-D189B794D626}" type="datetimeFigureOut">
               <a:rPr lang="it-IT" smtClean="0"/>
-              <a:t>18/07/2023</a:t>
+              <a:t>21/07/2023</a:t>
             </a:fld>
             <a:endParaRPr lang="it-IT"/>
           </a:p>
@@ -612,7 +612,7 @@
           <a:p>
             <a:fld id="{63A6C3C1-06F9-4130-B0BD-F60670099ED3}" type="datetimeFigureOut">
               <a:rPr lang="it-IT" smtClean="0"/>
-              <a:t>18/07/2023</a:t>
+              <a:t>21/07/2023</a:t>
             </a:fld>
             <a:endParaRPr lang="it-IT"/>
           </a:p>
@@ -794,7 +794,7 @@
           <a:p>
             <a:fld id="{63A6C3C1-06F9-4130-B0BD-F60670099ED3}" type="datetimeFigureOut">
               <a:rPr lang="it-IT" smtClean="0"/>
-              <a:t>18/07/2023</a:t>
+              <a:t>21/07/2023</a:t>
             </a:fld>
             <a:endParaRPr lang="it-IT"/>
           </a:p>
@@ -986,7 +986,7 @@
           <a:p>
             <a:fld id="{63A6C3C1-06F9-4130-B0BD-F60670099ED3}" type="datetimeFigureOut">
               <a:rPr lang="it-IT" smtClean="0"/>
-              <a:t>18/07/2023</a:t>
+              <a:t>21/07/2023</a:t>
             </a:fld>
             <a:endParaRPr lang="it-IT"/>
           </a:p>
@@ -1168,7 +1168,7 @@
           <a:p>
             <a:fld id="{63A6C3C1-06F9-4130-B0BD-F60670099ED3}" type="datetimeFigureOut">
               <a:rPr lang="it-IT" smtClean="0"/>
-              <a:t>18/07/2023</a:t>
+              <a:t>21/07/2023</a:t>
             </a:fld>
             <a:endParaRPr lang="it-IT"/>
           </a:p>
@@ -1426,7 +1426,7 @@
           <a:p>
             <a:fld id="{63A6C3C1-06F9-4130-B0BD-F60670099ED3}" type="datetimeFigureOut">
               <a:rPr lang="it-IT" smtClean="0"/>
-              <a:t>18/07/2023</a:t>
+              <a:t>21/07/2023</a:t>
             </a:fld>
             <a:endParaRPr lang="it-IT"/>
           </a:p>
@@ -1670,7 +1670,7 @@
           <a:p>
             <a:fld id="{63A6C3C1-06F9-4130-B0BD-F60670099ED3}" type="datetimeFigureOut">
               <a:rPr lang="it-IT" smtClean="0"/>
-              <a:t>18/07/2023</a:t>
+              <a:t>21/07/2023</a:t>
             </a:fld>
             <a:endParaRPr lang="it-IT"/>
           </a:p>
@@ -2049,7 +2049,7 @@
           <a:p>
             <a:fld id="{63A6C3C1-06F9-4130-B0BD-F60670099ED3}" type="datetimeFigureOut">
               <a:rPr lang="it-IT" smtClean="0"/>
-              <a:t>18/07/2023</a:t>
+              <a:t>21/07/2023</a:t>
             </a:fld>
             <a:endParaRPr lang="it-IT"/>
           </a:p>
@@ -2179,7 +2179,7 @@
           <a:p>
             <a:fld id="{63A6C3C1-06F9-4130-B0BD-F60670099ED3}" type="datetimeFigureOut">
               <a:rPr lang="it-IT" smtClean="0"/>
-              <a:t>18/07/2023</a:t>
+              <a:t>21/07/2023</a:t>
             </a:fld>
             <a:endParaRPr lang="it-IT"/>
           </a:p>
@@ -2286,7 +2286,7 @@
           <a:p>
             <a:fld id="{63A6C3C1-06F9-4130-B0BD-F60670099ED3}" type="datetimeFigureOut">
               <a:rPr lang="it-IT" smtClean="0"/>
-              <a:t>18/07/2023</a:t>
+              <a:t>21/07/2023</a:t>
             </a:fld>
             <a:endParaRPr lang="it-IT"/>
           </a:p>
@@ -2575,7 +2575,7 @@
           <a:p>
             <a:fld id="{63A6C3C1-06F9-4130-B0BD-F60670099ED3}" type="datetimeFigureOut">
               <a:rPr lang="it-IT" smtClean="0"/>
-              <a:t>18/07/2023</a:t>
+              <a:t>21/07/2023</a:t>
             </a:fld>
             <a:endParaRPr lang="it-IT"/>
           </a:p>
@@ -2844,7 +2844,7 @@
           <a:p>
             <a:fld id="{63A6C3C1-06F9-4130-B0BD-F60670099ED3}" type="datetimeFigureOut">
               <a:rPr lang="it-IT" smtClean="0"/>
-              <a:t>18/07/2023</a:t>
+              <a:t>21/07/2023</a:t>
             </a:fld>
             <a:endParaRPr lang="it-IT"/>
           </a:p>
@@ -3069,7 +3069,7 @@
           <a:p>
             <a:fld id="{63A6C3C1-06F9-4130-B0BD-F60670099ED3}" type="datetimeFigureOut">
               <a:rPr lang="it-IT" smtClean="0"/>
-              <a:t>18/07/2023</a:t>
+              <a:t>21/07/2023</a:t>
             </a:fld>
             <a:endParaRPr lang="it-IT"/>
           </a:p>
@@ -17899,442 +17899,411 @@
           </a:p>
         </p:txBody>
       </p:sp>
-      <p:grpSp>
-        <p:nvGrpSpPr>
-          <p:cNvPr id="9" name="Gruppo 8">
+      <p:cxnSp>
+        <p:nvCxnSpPr>
+          <p:cNvPr id="41" name="Google Shape;719;p22">
             <a:extLst>
               <a:ext uri="{FF2B5EF4-FFF2-40B4-BE49-F238E27FC236}">
-                <a16:creationId xmlns:a16="http://schemas.microsoft.com/office/drawing/2014/main" id="{27C3A8E6-55C2-8C7F-AB49-119151368898}"/>
+                <a16:creationId xmlns:a16="http://schemas.microsoft.com/office/drawing/2014/main" id="{9FE86854-3A18-F0CF-0E1B-41073E22ADB1}"/>
               </a:ext>
             </a:extLst>
           </p:cNvPr>
-          <p:cNvGrpSpPr/>
+          <p:cNvCxnSpPr>
+            <a:cxnSpLocks/>
+            <a:stCxn id="57" idx="3"/>
+          </p:cNvCxnSpPr>
           <p:nvPr/>
-        </p:nvGrpSpPr>
-        <p:grpSpPr>
+        </p:nvCxnSpPr>
+        <p:spPr>
           <a:xfrm>
-            <a:off x="459870" y="1661367"/>
-            <a:ext cx="11272260" cy="4957775"/>
-            <a:chOff x="626850" y="1728216"/>
-            <a:chExt cx="10955633" cy="4818516"/>
+            <a:off x="5581455" y="1992879"/>
+            <a:ext cx="352972" cy="4619765"/>
           </a:xfrm>
-        </p:grpSpPr>
-        <p:cxnSp>
-          <p:nvCxnSpPr>
-            <p:cNvPr id="41" name="Google Shape;719;p22">
-              <a:extLst>
-                <a:ext uri="{FF2B5EF4-FFF2-40B4-BE49-F238E27FC236}">
-                  <a16:creationId xmlns:a16="http://schemas.microsoft.com/office/drawing/2014/main" id="{9FE86854-3A18-F0CF-0E1B-41073E22ADB1}"/>
-                </a:ext>
-              </a:extLst>
-            </p:cNvPr>
-            <p:cNvCxnSpPr>
-              <a:cxnSpLocks/>
-              <a:stCxn id="57" idx="3"/>
-            </p:cNvCxnSpPr>
-            <p:nvPr/>
-          </p:nvCxnSpPr>
-          <p:spPr>
-            <a:xfrm>
-              <a:off x="5604575" y="2050416"/>
-              <a:ext cx="343057" cy="4490000"/>
-            </a:xfrm>
-            <a:prstGeom prst="bentConnector2">
-              <a:avLst/>
-            </a:prstGeom>
+          <a:prstGeom prst="bentConnector2">
+            <a:avLst/>
+          </a:prstGeom>
+          <a:noFill/>
+          <a:ln w="38100" cap="flat" cmpd="sng">
+            <a:solidFill>
+              <a:schemeClr val="accent4"/>
+            </a:solidFill>
+            <a:prstDash val="solid"/>
+            <a:round/>
+            <a:headEnd type="none" w="med" len="med"/>
+            <a:tailEnd type="oval" w="med" len="med"/>
+          </a:ln>
+        </p:spPr>
+      </p:cxnSp>
+      <p:sp>
+        <p:nvSpPr>
+          <p:cNvPr id="42" name="Google Shape;721;p22">
+            <a:extLst>
+              <a:ext uri="{FF2B5EF4-FFF2-40B4-BE49-F238E27FC236}">
+                <a16:creationId xmlns:a16="http://schemas.microsoft.com/office/drawing/2014/main" id="{0EC3F2F2-4DAE-C861-0F35-91DAC9F92CAA}"/>
+              </a:ext>
+            </a:extLst>
+          </p:cNvPr>
+          <p:cNvSpPr/>
+          <p:nvPr/>
+        </p:nvSpPr>
+        <p:spPr>
+          <a:xfrm>
+            <a:off x="459870" y="2478863"/>
+            <a:ext cx="5121585" cy="1277072"/>
+          </a:xfrm>
+          <a:prstGeom prst="roundRect">
+            <a:avLst>
+              <a:gd name="adj" fmla="val 22134"/>
+            </a:avLst>
+          </a:prstGeom>
+          <a:solidFill>
+            <a:schemeClr val="lt2"/>
+          </a:solidFill>
+          <a:ln>
             <a:noFill/>
-            <a:ln w="38100" cap="flat" cmpd="sng">
-              <a:solidFill>
-                <a:schemeClr val="accent4"/>
-              </a:solidFill>
-              <a:prstDash val="solid"/>
-              <a:round/>
-              <a:headEnd type="none" w="med" len="med"/>
-              <a:tailEnd type="oval" w="med" len="med"/>
-            </a:ln>
-          </p:spPr>
-        </p:cxnSp>
-        <p:sp>
-          <p:nvSpPr>
-            <p:cNvPr id="42" name="Google Shape;721;p22">
-              <a:extLst>
-                <a:ext uri="{FF2B5EF4-FFF2-40B4-BE49-F238E27FC236}">
-                  <a16:creationId xmlns:a16="http://schemas.microsoft.com/office/drawing/2014/main" id="{0EC3F2F2-4DAE-C861-0F35-91DAC9F92CAA}"/>
-                </a:ext>
-              </a:extLst>
-            </p:cNvPr>
-            <p:cNvSpPr/>
-            <p:nvPr/>
-          </p:nvSpPr>
-          <p:spPr>
-            <a:xfrm>
-              <a:off x="626850" y="2522749"/>
-              <a:ext cx="4977725" cy="1241200"/>
-            </a:xfrm>
-            <a:prstGeom prst="roundRect">
-              <a:avLst>
-                <a:gd name="adj" fmla="val 22134"/>
-              </a:avLst>
-            </a:prstGeom>
-            <a:solidFill>
-              <a:schemeClr val="lt2"/>
-            </a:solidFill>
-            <a:ln>
-              <a:noFill/>
-            </a:ln>
-          </p:spPr>
-          <p:txBody>
-            <a:bodyPr spcFirstLastPara="1" wrap="square" lIns="121900" tIns="121900" rIns="121900" bIns="121900" anchor="ctr" anchorCtr="0">
-              <a:noAutofit/>
-            </a:bodyPr>
-            <a:lstStyle/>
-            <a:p>
-              <a:endParaRPr sz="2400"/>
-            </a:p>
-          </p:txBody>
-        </p:sp>
-        <p:sp>
-          <p:nvSpPr>
-            <p:cNvPr id="43" name="Google Shape;722;p22">
-              <a:extLst>
-                <a:ext uri="{FF2B5EF4-FFF2-40B4-BE49-F238E27FC236}">
-                  <a16:creationId xmlns:a16="http://schemas.microsoft.com/office/drawing/2014/main" id="{CACFEE15-C577-D1E2-6DF3-DF1E65F6C7E7}"/>
-                </a:ext>
-              </a:extLst>
-            </p:cNvPr>
-            <p:cNvSpPr/>
-            <p:nvPr/>
-          </p:nvSpPr>
-          <p:spPr>
-            <a:xfrm>
-              <a:off x="6604757" y="2522749"/>
-              <a:ext cx="4977723" cy="1241200"/>
-            </a:xfrm>
-            <a:prstGeom prst="roundRect">
-              <a:avLst>
-                <a:gd name="adj" fmla="val 22134"/>
-              </a:avLst>
-            </a:prstGeom>
-            <a:solidFill>
-              <a:schemeClr val="lt2"/>
-            </a:solidFill>
-            <a:ln>
-              <a:noFill/>
-            </a:ln>
-          </p:spPr>
-          <p:txBody>
-            <a:bodyPr spcFirstLastPara="1" wrap="square" lIns="121900" tIns="121900" rIns="121900" bIns="121900" anchor="ctr" anchorCtr="0">
-              <a:noAutofit/>
-            </a:bodyPr>
-            <a:lstStyle/>
-            <a:p>
-              <a:endParaRPr sz="2400"/>
-            </a:p>
-          </p:txBody>
-        </p:sp>
-        <p:sp>
-          <p:nvSpPr>
-            <p:cNvPr id="44" name="Google Shape;723;p22">
-              <a:extLst>
-                <a:ext uri="{FF2B5EF4-FFF2-40B4-BE49-F238E27FC236}">
-                  <a16:creationId xmlns:a16="http://schemas.microsoft.com/office/drawing/2014/main" id="{EF0FFE5E-0F25-21B1-6DF6-EB448230A21B}"/>
-                </a:ext>
-              </a:extLst>
-            </p:cNvPr>
-            <p:cNvSpPr/>
-            <p:nvPr/>
-          </p:nvSpPr>
-          <p:spPr>
-            <a:xfrm>
-              <a:off x="626850" y="3914140"/>
-              <a:ext cx="4977725" cy="1241200"/>
-            </a:xfrm>
-            <a:prstGeom prst="roundRect">
-              <a:avLst>
-                <a:gd name="adj" fmla="val 22134"/>
-              </a:avLst>
-            </a:prstGeom>
-            <a:solidFill>
-              <a:schemeClr val="lt2"/>
-            </a:solidFill>
-            <a:ln>
-              <a:noFill/>
-            </a:ln>
-          </p:spPr>
-          <p:txBody>
-            <a:bodyPr spcFirstLastPara="1" wrap="square" lIns="121900" tIns="121900" rIns="121900" bIns="121900" anchor="ctr" anchorCtr="0">
-              <a:noAutofit/>
-            </a:bodyPr>
-            <a:lstStyle/>
-            <a:p>
-              <a:endParaRPr sz="2400"/>
-            </a:p>
-          </p:txBody>
-        </p:sp>
-        <p:sp>
-          <p:nvSpPr>
-            <p:cNvPr id="45" name="Google Shape;724;p22">
-              <a:extLst>
-                <a:ext uri="{FF2B5EF4-FFF2-40B4-BE49-F238E27FC236}">
-                  <a16:creationId xmlns:a16="http://schemas.microsoft.com/office/drawing/2014/main" id="{79FC8E1C-3648-CB5F-FBBD-B96EC8C0ADF9}"/>
-                </a:ext>
-              </a:extLst>
-            </p:cNvPr>
-            <p:cNvSpPr/>
-            <p:nvPr/>
-          </p:nvSpPr>
-          <p:spPr>
-            <a:xfrm>
-              <a:off x="6604757" y="3914140"/>
-              <a:ext cx="4977723" cy="1241200"/>
-            </a:xfrm>
-            <a:prstGeom prst="roundRect">
-              <a:avLst>
-                <a:gd name="adj" fmla="val 22134"/>
-              </a:avLst>
-            </a:prstGeom>
-            <a:solidFill>
-              <a:schemeClr val="lt2"/>
-            </a:solidFill>
-            <a:ln>
-              <a:noFill/>
-            </a:ln>
-          </p:spPr>
-          <p:txBody>
-            <a:bodyPr spcFirstLastPara="1" wrap="square" lIns="121900" tIns="121900" rIns="121900" bIns="121900" anchor="ctr" anchorCtr="0">
-              <a:noAutofit/>
-            </a:bodyPr>
-            <a:lstStyle/>
-            <a:p>
-              <a:endParaRPr sz="2400"/>
-            </a:p>
-          </p:txBody>
-        </p:sp>
-        <p:sp>
-          <p:nvSpPr>
-            <p:cNvPr id="46" name="Google Shape;725;p22">
-              <a:extLst>
-                <a:ext uri="{FF2B5EF4-FFF2-40B4-BE49-F238E27FC236}">
-                  <a16:creationId xmlns:a16="http://schemas.microsoft.com/office/drawing/2014/main" id="{39E6F02A-B992-5B32-4A34-F493442A71C7}"/>
-                </a:ext>
-              </a:extLst>
-            </p:cNvPr>
-            <p:cNvSpPr/>
-            <p:nvPr/>
-          </p:nvSpPr>
-          <p:spPr>
-            <a:xfrm>
-              <a:off x="626850" y="5305532"/>
-              <a:ext cx="4977725" cy="1241200"/>
-            </a:xfrm>
-            <a:prstGeom prst="roundRect">
-              <a:avLst>
-                <a:gd name="adj" fmla="val 22134"/>
-              </a:avLst>
-            </a:prstGeom>
-            <a:solidFill>
-              <a:schemeClr val="lt2"/>
-            </a:solidFill>
-            <a:ln>
-              <a:noFill/>
-            </a:ln>
-          </p:spPr>
-          <p:txBody>
-            <a:bodyPr spcFirstLastPara="1" wrap="square" lIns="121900" tIns="121900" rIns="121900" bIns="121900" anchor="ctr" anchorCtr="0">
-              <a:noAutofit/>
-            </a:bodyPr>
-            <a:lstStyle/>
-            <a:p>
-              <a:endParaRPr sz="2400"/>
-            </a:p>
-          </p:txBody>
-        </p:sp>
-        <p:sp>
-          <p:nvSpPr>
-            <p:cNvPr id="47" name="Google Shape;727;p22">
-              <a:extLst>
-                <a:ext uri="{FF2B5EF4-FFF2-40B4-BE49-F238E27FC236}">
-                  <a16:creationId xmlns:a16="http://schemas.microsoft.com/office/drawing/2014/main" id="{0B076B8B-90DB-8E78-05F6-70AB5622AD28}"/>
-                </a:ext>
-              </a:extLst>
-            </p:cNvPr>
-            <p:cNvSpPr txBox="1"/>
-            <p:nvPr/>
-          </p:nvSpPr>
-          <p:spPr>
-            <a:xfrm>
-              <a:off x="2139823" y="2632789"/>
-              <a:ext cx="3275913" cy="548400"/>
-            </a:xfrm>
-            <a:prstGeom prst="rect">
-              <a:avLst/>
-            </a:prstGeom>
+          </a:ln>
+        </p:spPr>
+        <p:txBody>
+          <a:bodyPr spcFirstLastPara="1" wrap="square" lIns="121900" tIns="121900" rIns="121900" bIns="121900" anchor="ctr" anchorCtr="0">
+            <a:noAutofit/>
+          </a:bodyPr>
+          <a:lstStyle/>
+          <a:p>
+            <a:endParaRPr sz="2400"/>
+          </a:p>
+        </p:txBody>
+      </p:sp>
+      <p:sp>
+        <p:nvSpPr>
+          <p:cNvPr id="43" name="Google Shape;722;p22">
+            <a:extLst>
+              <a:ext uri="{FF2B5EF4-FFF2-40B4-BE49-F238E27FC236}">
+                <a16:creationId xmlns:a16="http://schemas.microsoft.com/office/drawing/2014/main" id="{CACFEE15-C577-D1E2-6DF3-DF1E65F6C7E7}"/>
+              </a:ext>
+            </a:extLst>
+          </p:cNvPr>
+          <p:cNvSpPr/>
+          <p:nvPr/>
+        </p:nvSpPr>
+        <p:spPr>
+          <a:xfrm>
+            <a:off x="6610544" y="2478863"/>
+            <a:ext cx="5121583" cy="1277072"/>
+          </a:xfrm>
+          <a:prstGeom prst="roundRect">
+            <a:avLst>
+              <a:gd name="adj" fmla="val 22134"/>
+            </a:avLst>
+          </a:prstGeom>
+          <a:solidFill>
+            <a:schemeClr val="lt2"/>
+          </a:solidFill>
+          <a:ln>
             <a:noFill/>
-            <a:ln>
-              <a:noFill/>
-            </a:ln>
-          </p:spPr>
-          <p:txBody>
-            <a:bodyPr spcFirstLastPara="1" wrap="square" lIns="121900" tIns="121900" rIns="121900" bIns="121900" anchor="ctr" anchorCtr="0">
-              <a:noAutofit/>
-            </a:bodyPr>
-            <a:lstStyle/>
-            <a:p>
-              <a:pPr algn="r"/>
-              <a:r>
-                <a:rPr lang="it-IT" sz="2000" b="1" dirty="0">
-                  <a:latin typeface="Fira Sans Extra Condensed Medium"/>
-                  <a:ea typeface="Fira Sans Extra Condensed Medium"/>
-                  <a:cs typeface="Fira Sans Extra Condensed Medium"/>
-                  <a:sym typeface="Fira Sans Extra Condensed Medium"/>
-                </a:rPr>
-                <a:t>Workflow semplificato</a:t>
-              </a:r>
-            </a:p>
-          </p:txBody>
-        </p:sp>
-        <p:sp>
-          <p:nvSpPr>
-            <p:cNvPr id="48" name="Google Shape;728;p22">
-              <a:extLst>
-                <a:ext uri="{FF2B5EF4-FFF2-40B4-BE49-F238E27FC236}">
-                  <a16:creationId xmlns:a16="http://schemas.microsoft.com/office/drawing/2014/main" id="{08BCF8C4-F79B-0ED9-B4A2-4881E67FB685}"/>
-                </a:ext>
-              </a:extLst>
-            </p:cNvPr>
-            <p:cNvSpPr txBox="1"/>
-            <p:nvPr/>
-          </p:nvSpPr>
-          <p:spPr>
-            <a:xfrm>
-              <a:off x="945086" y="3003752"/>
-              <a:ext cx="4470649" cy="548400"/>
-            </a:xfrm>
-            <a:prstGeom prst="rect">
-              <a:avLst/>
-            </a:prstGeom>
+          </a:ln>
+        </p:spPr>
+        <p:txBody>
+          <a:bodyPr spcFirstLastPara="1" wrap="square" lIns="121900" tIns="121900" rIns="121900" bIns="121900" anchor="ctr" anchorCtr="0">
+            <a:noAutofit/>
+          </a:bodyPr>
+          <a:lstStyle/>
+          <a:p>
+            <a:endParaRPr sz="2400"/>
+          </a:p>
+        </p:txBody>
+      </p:sp>
+      <p:sp>
+        <p:nvSpPr>
+          <p:cNvPr id="44" name="Google Shape;723;p22">
+            <a:extLst>
+              <a:ext uri="{FF2B5EF4-FFF2-40B4-BE49-F238E27FC236}">
+                <a16:creationId xmlns:a16="http://schemas.microsoft.com/office/drawing/2014/main" id="{EF0FFE5E-0F25-21B1-6DF6-EB448230A21B}"/>
+              </a:ext>
+            </a:extLst>
+          </p:cNvPr>
+          <p:cNvSpPr/>
+          <p:nvPr/>
+        </p:nvSpPr>
+        <p:spPr>
+          <a:xfrm>
+            <a:off x="459870" y="3910466"/>
+            <a:ext cx="5121585" cy="1277072"/>
+          </a:xfrm>
+          <a:prstGeom prst="roundRect">
+            <a:avLst>
+              <a:gd name="adj" fmla="val 22134"/>
+            </a:avLst>
+          </a:prstGeom>
+          <a:solidFill>
+            <a:schemeClr val="lt2"/>
+          </a:solidFill>
+          <a:ln>
             <a:noFill/>
-            <a:ln>
-              <a:noFill/>
-            </a:ln>
-          </p:spPr>
-          <p:txBody>
-            <a:bodyPr spcFirstLastPara="1" wrap="square" lIns="121900" tIns="121900" rIns="121900" bIns="121900" anchor="t" anchorCtr="0">
-              <a:noAutofit/>
-            </a:bodyPr>
-            <a:lstStyle/>
-            <a:p>
-              <a:pPr algn="r"/>
-              <a:r>
-                <a:rPr lang="it-IT" sz="1600" dirty="0">
-                  <a:latin typeface="Fira Sans"/>
-                  <a:ea typeface="Fira Sans"/>
-                  <a:cs typeface="Fira Sans"/>
-                  <a:sym typeface="Fira Sans"/>
-                </a:rPr>
-                <a:t>Semplifica la generazione di dati sintetici con un linguaggio intuitivo e user-friendly</a:t>
-              </a:r>
-            </a:p>
-          </p:txBody>
-        </p:sp>
-        <p:sp>
-          <p:nvSpPr>
-            <p:cNvPr id="49" name="Google Shape;729;p22">
-              <a:extLst>
-                <a:ext uri="{FF2B5EF4-FFF2-40B4-BE49-F238E27FC236}">
-                  <a16:creationId xmlns:a16="http://schemas.microsoft.com/office/drawing/2014/main" id="{4DD5C387-EDE7-37CA-8984-E02715986042}"/>
-                </a:ext>
-              </a:extLst>
-            </p:cNvPr>
-            <p:cNvSpPr txBox="1"/>
-            <p:nvPr/>
-          </p:nvSpPr>
-          <p:spPr>
-            <a:xfrm>
-              <a:off x="1996367" y="4024031"/>
-              <a:ext cx="3419368" cy="548400"/>
-            </a:xfrm>
-            <a:prstGeom prst="rect">
-              <a:avLst/>
-            </a:prstGeom>
+          </a:ln>
+        </p:spPr>
+        <p:txBody>
+          <a:bodyPr spcFirstLastPara="1" wrap="square" lIns="121900" tIns="121900" rIns="121900" bIns="121900" anchor="ctr" anchorCtr="0">
+            <a:noAutofit/>
+          </a:bodyPr>
+          <a:lstStyle/>
+          <a:p>
+            <a:endParaRPr sz="2400"/>
+          </a:p>
+        </p:txBody>
+      </p:sp>
+      <p:sp>
+        <p:nvSpPr>
+          <p:cNvPr id="45" name="Google Shape;724;p22">
+            <a:extLst>
+              <a:ext uri="{FF2B5EF4-FFF2-40B4-BE49-F238E27FC236}">
+                <a16:creationId xmlns:a16="http://schemas.microsoft.com/office/drawing/2014/main" id="{79FC8E1C-3648-CB5F-FBBD-B96EC8C0ADF9}"/>
+              </a:ext>
+            </a:extLst>
+          </p:cNvPr>
+          <p:cNvSpPr/>
+          <p:nvPr/>
+        </p:nvSpPr>
+        <p:spPr>
+          <a:xfrm>
+            <a:off x="6610544" y="3910466"/>
+            <a:ext cx="5121583" cy="1277072"/>
+          </a:xfrm>
+          <a:prstGeom prst="roundRect">
+            <a:avLst>
+              <a:gd name="adj" fmla="val 22134"/>
+            </a:avLst>
+          </a:prstGeom>
+          <a:solidFill>
+            <a:schemeClr val="lt2"/>
+          </a:solidFill>
+          <a:ln>
             <a:noFill/>
-            <a:ln>
-              <a:noFill/>
-            </a:ln>
-          </p:spPr>
-          <p:txBody>
-            <a:bodyPr spcFirstLastPara="1" wrap="square" lIns="121900" tIns="121900" rIns="121900" bIns="121900" anchor="ctr" anchorCtr="0">
-              <a:noAutofit/>
-            </a:bodyPr>
-            <a:lstStyle/>
-            <a:p>
-              <a:pPr algn="r"/>
-              <a:r>
-                <a:rPr lang="it-IT" sz="2000" b="1" dirty="0">
-                  <a:latin typeface="Fira Sans Extra Condensed Medium"/>
-                  <a:ea typeface="Fira Sans Extra Condensed Medium"/>
-                  <a:cs typeface="Fira Sans Extra Condensed Medium"/>
-                  <a:sym typeface="Fira Sans Extra Condensed Medium"/>
-                </a:rPr>
-                <a:t>Technology Freedom</a:t>
-              </a:r>
-              <a:endParaRPr sz="2000" b="1" dirty="0">
-                <a:solidFill>
-                  <a:srgbClr val="000000"/>
-                </a:solidFill>
+          </a:ln>
+        </p:spPr>
+        <p:txBody>
+          <a:bodyPr spcFirstLastPara="1" wrap="square" lIns="121900" tIns="121900" rIns="121900" bIns="121900" anchor="ctr" anchorCtr="0">
+            <a:noAutofit/>
+          </a:bodyPr>
+          <a:lstStyle/>
+          <a:p>
+            <a:endParaRPr sz="2400"/>
+          </a:p>
+        </p:txBody>
+      </p:sp>
+      <p:sp>
+        <p:nvSpPr>
+          <p:cNvPr id="46" name="Google Shape;725;p22">
+            <a:extLst>
+              <a:ext uri="{FF2B5EF4-FFF2-40B4-BE49-F238E27FC236}">
+                <a16:creationId xmlns:a16="http://schemas.microsoft.com/office/drawing/2014/main" id="{39E6F02A-B992-5B32-4A34-F493442A71C7}"/>
+              </a:ext>
+            </a:extLst>
+          </p:cNvPr>
+          <p:cNvSpPr/>
+          <p:nvPr/>
+        </p:nvSpPr>
+        <p:spPr>
+          <a:xfrm>
+            <a:off x="459870" y="5342070"/>
+            <a:ext cx="5121585" cy="1277072"/>
+          </a:xfrm>
+          <a:prstGeom prst="roundRect">
+            <a:avLst>
+              <a:gd name="adj" fmla="val 22134"/>
+            </a:avLst>
+          </a:prstGeom>
+          <a:solidFill>
+            <a:schemeClr val="lt2"/>
+          </a:solidFill>
+          <a:ln>
+            <a:noFill/>
+          </a:ln>
+        </p:spPr>
+        <p:txBody>
+          <a:bodyPr spcFirstLastPara="1" wrap="square" lIns="121900" tIns="121900" rIns="121900" bIns="121900" anchor="ctr" anchorCtr="0">
+            <a:noAutofit/>
+          </a:bodyPr>
+          <a:lstStyle/>
+          <a:p>
+            <a:endParaRPr sz="2400"/>
+          </a:p>
+        </p:txBody>
+      </p:sp>
+      <p:sp>
+        <p:nvSpPr>
+          <p:cNvPr id="47" name="Google Shape;727;p22">
+            <a:extLst>
+              <a:ext uri="{FF2B5EF4-FFF2-40B4-BE49-F238E27FC236}">
+                <a16:creationId xmlns:a16="http://schemas.microsoft.com/office/drawing/2014/main" id="{0B076B8B-90DB-8E78-05F6-70AB5622AD28}"/>
+              </a:ext>
+            </a:extLst>
+          </p:cNvPr>
+          <p:cNvSpPr txBox="1"/>
+          <p:nvPr/>
+        </p:nvSpPr>
+        <p:spPr>
+          <a:xfrm>
+            <a:off x="2016569" y="2592083"/>
+            <a:ext cx="3370590" cy="564249"/>
+          </a:xfrm>
+          <a:prstGeom prst="rect">
+            <a:avLst/>
+          </a:prstGeom>
+          <a:noFill/>
+          <a:ln>
+            <a:noFill/>
+          </a:ln>
+        </p:spPr>
+        <p:txBody>
+          <a:bodyPr spcFirstLastPara="1" wrap="square" lIns="121900" tIns="121900" rIns="121900" bIns="121900" anchor="ctr" anchorCtr="0">
+            <a:noAutofit/>
+          </a:bodyPr>
+          <a:lstStyle/>
+          <a:p>
+            <a:pPr algn="r"/>
+            <a:r>
+              <a:rPr lang="it-IT" sz="2000" b="1" dirty="0">
                 <a:latin typeface="Fira Sans Extra Condensed Medium"/>
                 <a:ea typeface="Fira Sans Extra Condensed Medium"/>
                 <a:cs typeface="Fira Sans Extra Condensed Medium"/>
                 <a:sym typeface="Fira Sans Extra Condensed Medium"/>
-              </a:endParaRPr>
-            </a:p>
-          </p:txBody>
-        </p:sp>
-        <p:sp>
-          <p:nvSpPr>
-            <p:cNvPr id="50" name="Google Shape;730;p22">
-              <a:extLst>
-                <a:ext uri="{FF2B5EF4-FFF2-40B4-BE49-F238E27FC236}">
-                  <a16:creationId xmlns:a16="http://schemas.microsoft.com/office/drawing/2014/main" id="{341E6A0C-E7AB-09B7-EE2F-7B61EA837917}"/>
-                </a:ext>
-              </a:extLst>
-            </p:cNvPr>
-            <p:cNvSpPr txBox="1"/>
-            <p:nvPr/>
-          </p:nvSpPr>
-          <p:spPr>
-            <a:xfrm>
-              <a:off x="945086" y="4394983"/>
-              <a:ext cx="4470653" cy="548400"/>
-            </a:xfrm>
-            <a:prstGeom prst="rect">
-              <a:avLst/>
-            </a:prstGeom>
+              </a:rPr>
+              <a:t>Workflow semplificato</a:t>
+            </a:r>
+          </a:p>
+        </p:txBody>
+      </p:sp>
+      <p:sp>
+        <p:nvSpPr>
+          <p:cNvPr id="48" name="Google Shape;728;p22">
+            <a:extLst>
+              <a:ext uri="{FF2B5EF4-FFF2-40B4-BE49-F238E27FC236}">
+                <a16:creationId xmlns:a16="http://schemas.microsoft.com/office/drawing/2014/main" id="{08BCF8C4-F79B-0ED9-B4A2-4881E67FB685}"/>
+              </a:ext>
+            </a:extLst>
+          </p:cNvPr>
+          <p:cNvSpPr txBox="1"/>
+          <p:nvPr/>
+        </p:nvSpPr>
+        <p:spPr>
+          <a:xfrm>
+            <a:off x="787303" y="2973767"/>
+            <a:ext cx="4599855" cy="564249"/>
+          </a:xfrm>
+          <a:prstGeom prst="rect">
+            <a:avLst/>
+          </a:prstGeom>
+          <a:noFill/>
+          <a:ln>
             <a:noFill/>
-            <a:ln>
-              <a:noFill/>
-            </a:ln>
-          </p:spPr>
-          <p:txBody>
-            <a:bodyPr spcFirstLastPara="1" wrap="square" lIns="121900" tIns="121900" rIns="121900" bIns="121900" anchor="t" anchorCtr="0">
-              <a:noAutofit/>
-            </a:bodyPr>
-            <a:lstStyle/>
-            <a:p>
-              <a:pPr algn="r"/>
-              <a:r>
-                <a:rPr lang="it-IT" sz="1600" dirty="0">
-                  <a:solidFill>
-                    <a:schemeClr val="dk1"/>
-                  </a:solidFill>
-                  <a:latin typeface="Fira Sans"/>
-                  <a:ea typeface="Fira Sans"/>
-                  <a:cs typeface="Fira Sans"/>
-                  <a:sym typeface="Fira Sans"/>
-                </a:rPr>
-                <a:t>Compatibile con diversi motori 3D, garantisce flessibilità ed evita il lock-in tecnologico</a:t>
-              </a:r>
-              <a:endParaRPr lang="en-US" sz="1600" dirty="0">
+          </a:ln>
+        </p:spPr>
+        <p:txBody>
+          <a:bodyPr spcFirstLastPara="1" wrap="square" lIns="121900" tIns="121900" rIns="121900" bIns="121900" anchor="t" anchorCtr="0">
+            <a:noAutofit/>
+          </a:bodyPr>
+          <a:lstStyle/>
+          <a:p>
+            <a:pPr algn="r"/>
+            <a:r>
+              <a:rPr lang="it-IT" sz="1600" dirty="0">
+                <a:latin typeface="Fira Sans"/>
+                <a:ea typeface="Fira Sans"/>
+                <a:cs typeface="Fira Sans"/>
+                <a:sym typeface="Fira Sans"/>
+              </a:rPr>
+              <a:t>Semplifica la generazione di dati sintetici con un linguaggio intuitivo e user-friendly</a:t>
+            </a:r>
+          </a:p>
+        </p:txBody>
+      </p:sp>
+      <p:sp>
+        <p:nvSpPr>
+          <p:cNvPr id="49" name="Google Shape;729;p22">
+            <a:extLst>
+              <a:ext uri="{FF2B5EF4-FFF2-40B4-BE49-F238E27FC236}">
+                <a16:creationId xmlns:a16="http://schemas.microsoft.com/office/drawing/2014/main" id="{4DD5C387-EDE7-37CA-8984-E02715986042}"/>
+              </a:ext>
+            </a:extLst>
+          </p:cNvPr>
+          <p:cNvSpPr txBox="1"/>
+          <p:nvPr/>
+        </p:nvSpPr>
+        <p:spPr>
+          <a:xfrm>
+            <a:off x="1868967" y="4023533"/>
+            <a:ext cx="3518191" cy="564249"/>
+          </a:xfrm>
+          <a:prstGeom prst="rect">
+            <a:avLst/>
+          </a:prstGeom>
+          <a:noFill/>
+          <a:ln>
+            <a:noFill/>
+          </a:ln>
+        </p:spPr>
+        <p:txBody>
+          <a:bodyPr spcFirstLastPara="1" wrap="square" lIns="121900" tIns="121900" rIns="121900" bIns="121900" anchor="ctr" anchorCtr="0">
+            <a:noAutofit/>
+          </a:bodyPr>
+          <a:lstStyle/>
+          <a:p>
+            <a:pPr algn="r"/>
+            <a:r>
+              <a:rPr lang="it-IT" sz="2000" b="1" dirty="0">
+                <a:latin typeface="Fira Sans Extra Condensed Medium"/>
+                <a:ea typeface="Fira Sans Extra Condensed Medium"/>
+                <a:cs typeface="Fira Sans Extra Condensed Medium"/>
+                <a:sym typeface="Fira Sans Extra Condensed Medium"/>
+              </a:rPr>
+              <a:t>Technology Freedom</a:t>
+            </a:r>
+            <a:endParaRPr sz="2000" b="1" dirty="0">
+              <a:solidFill>
+                <a:srgbClr val="000000"/>
+              </a:solidFill>
+              <a:latin typeface="Fira Sans Extra Condensed Medium"/>
+              <a:ea typeface="Fira Sans Extra Condensed Medium"/>
+              <a:cs typeface="Fira Sans Extra Condensed Medium"/>
+              <a:sym typeface="Fira Sans Extra Condensed Medium"/>
+            </a:endParaRPr>
+          </a:p>
+        </p:txBody>
+      </p:sp>
+      <p:sp>
+        <p:nvSpPr>
+          <p:cNvPr id="50" name="Google Shape;730;p22">
+            <a:extLst>
+              <a:ext uri="{FF2B5EF4-FFF2-40B4-BE49-F238E27FC236}">
+                <a16:creationId xmlns:a16="http://schemas.microsoft.com/office/drawing/2014/main" id="{341E6A0C-E7AB-09B7-EE2F-7B61EA837917}"/>
+              </a:ext>
+            </a:extLst>
+          </p:cNvPr>
+          <p:cNvSpPr txBox="1"/>
+          <p:nvPr/>
+        </p:nvSpPr>
+        <p:spPr>
+          <a:xfrm>
+            <a:off x="787303" y="4405206"/>
+            <a:ext cx="4599859" cy="564249"/>
+          </a:xfrm>
+          <a:prstGeom prst="rect">
+            <a:avLst/>
+          </a:prstGeom>
+          <a:noFill/>
+          <a:ln>
+            <a:noFill/>
+          </a:ln>
+        </p:spPr>
+        <p:txBody>
+          <a:bodyPr spcFirstLastPara="1" wrap="square" lIns="121900" tIns="121900" rIns="121900" bIns="121900" anchor="t" anchorCtr="0">
+            <a:noAutofit/>
+          </a:bodyPr>
+          <a:lstStyle/>
+          <a:p>
+            <a:pPr algn="r"/>
+            <a:r>
+              <a:rPr lang="it-IT" sz="1600" dirty="0">
                 <a:solidFill>
                   <a:schemeClr val="dk1"/>
                 </a:solidFill>
@@ -18342,307 +18311,108 @@
                 <a:ea typeface="Fira Sans"/>
                 <a:cs typeface="Fira Sans"/>
                 <a:sym typeface="Fira Sans"/>
-              </a:endParaRPr>
-            </a:p>
-          </p:txBody>
-        </p:sp>
-        <p:sp>
-          <p:nvSpPr>
-            <p:cNvPr id="51" name="Google Shape;731;p22">
-              <a:extLst>
-                <a:ext uri="{FF2B5EF4-FFF2-40B4-BE49-F238E27FC236}">
-                  <a16:creationId xmlns:a16="http://schemas.microsoft.com/office/drawing/2014/main" id="{15A36427-8CB6-3D13-65AA-579000AE8E4B}"/>
-                </a:ext>
-              </a:extLst>
-            </p:cNvPr>
-            <p:cNvSpPr txBox="1"/>
-            <p:nvPr/>
-          </p:nvSpPr>
-          <p:spPr>
-            <a:xfrm>
-              <a:off x="1161504" y="5415360"/>
-              <a:ext cx="4254231" cy="548400"/>
-            </a:xfrm>
-            <a:prstGeom prst="rect">
-              <a:avLst/>
-            </a:prstGeom>
+              </a:rPr>
+              <a:t>Compatibile con diversi motori 3D, garantisce flessibilità ed evita il lock-in tecnologico</a:t>
+            </a:r>
+            <a:endParaRPr lang="en-US" sz="1600" dirty="0">
+              <a:solidFill>
+                <a:schemeClr val="dk1"/>
+              </a:solidFill>
+              <a:latin typeface="Fira Sans"/>
+              <a:ea typeface="Fira Sans"/>
+              <a:cs typeface="Fira Sans"/>
+              <a:sym typeface="Fira Sans"/>
+            </a:endParaRPr>
+          </a:p>
+        </p:txBody>
+      </p:sp>
+      <p:sp>
+        <p:nvSpPr>
+          <p:cNvPr id="51" name="Google Shape;731;p22">
+            <a:extLst>
+              <a:ext uri="{FF2B5EF4-FFF2-40B4-BE49-F238E27FC236}">
+                <a16:creationId xmlns:a16="http://schemas.microsoft.com/office/drawing/2014/main" id="{15A36427-8CB6-3D13-65AA-579000AE8E4B}"/>
+              </a:ext>
+            </a:extLst>
+          </p:cNvPr>
+          <p:cNvSpPr txBox="1"/>
+          <p:nvPr/>
+        </p:nvSpPr>
+        <p:spPr>
+          <a:xfrm>
+            <a:off x="1009976" y="5455072"/>
+            <a:ext cx="4377182" cy="564249"/>
+          </a:xfrm>
+          <a:prstGeom prst="rect">
+            <a:avLst/>
+          </a:prstGeom>
+          <a:noFill/>
+          <a:ln>
             <a:noFill/>
-            <a:ln>
-              <a:noFill/>
-            </a:ln>
-          </p:spPr>
-          <p:txBody>
-            <a:bodyPr spcFirstLastPara="1" wrap="square" lIns="121900" tIns="121900" rIns="121900" bIns="121900" anchor="ctr" anchorCtr="0">
-              <a:noAutofit/>
-            </a:bodyPr>
-            <a:lstStyle/>
-            <a:p>
-              <a:pPr algn="r"/>
-              <a:r>
-                <a:rPr lang="it-IT" sz="2000" b="1" dirty="0">
-                  <a:latin typeface="Fira Sans Extra Condensed Medium"/>
-                  <a:ea typeface="Fira Sans Extra Condensed Medium"/>
-                  <a:cs typeface="Fira Sans Extra Condensed Medium"/>
-                  <a:sym typeface="Fira Sans Extra Condensed Medium"/>
-                </a:rPr>
-                <a:t>Collaborazione migliorata</a:t>
-              </a:r>
-              <a:endParaRPr sz="2000" b="1" dirty="0">
-                <a:solidFill>
-                  <a:srgbClr val="000000"/>
-                </a:solidFill>
+          </a:ln>
+        </p:spPr>
+        <p:txBody>
+          <a:bodyPr spcFirstLastPara="1" wrap="square" lIns="121900" tIns="121900" rIns="121900" bIns="121900" anchor="ctr" anchorCtr="0">
+            <a:noAutofit/>
+          </a:bodyPr>
+          <a:lstStyle/>
+          <a:p>
+            <a:pPr algn="r"/>
+            <a:r>
+              <a:rPr lang="it-IT" sz="2000" b="1" dirty="0">
                 <a:latin typeface="Fira Sans Extra Condensed Medium"/>
                 <a:ea typeface="Fira Sans Extra Condensed Medium"/>
                 <a:cs typeface="Fira Sans Extra Condensed Medium"/>
                 <a:sym typeface="Fira Sans Extra Condensed Medium"/>
-              </a:endParaRPr>
-            </a:p>
-          </p:txBody>
-        </p:sp>
-        <p:sp>
-          <p:nvSpPr>
-            <p:cNvPr id="52" name="Google Shape;732;p22">
-              <a:extLst>
-                <a:ext uri="{FF2B5EF4-FFF2-40B4-BE49-F238E27FC236}">
-                  <a16:creationId xmlns:a16="http://schemas.microsoft.com/office/drawing/2014/main" id="{1EDD97CA-C386-CE49-B953-9BE3EA2CC1A4}"/>
-                </a:ext>
-              </a:extLst>
-            </p:cNvPr>
-            <p:cNvSpPr txBox="1"/>
-            <p:nvPr/>
-          </p:nvSpPr>
-          <p:spPr>
-            <a:xfrm>
-              <a:off x="945086" y="5786345"/>
-              <a:ext cx="4470655" cy="580400"/>
-            </a:xfrm>
-            <a:prstGeom prst="rect">
-              <a:avLst/>
-            </a:prstGeom>
+              </a:rPr>
+              <a:t>Collaborazione migliorata</a:t>
+            </a:r>
+            <a:endParaRPr sz="2000" b="1" dirty="0">
+              <a:solidFill>
+                <a:srgbClr val="000000"/>
+              </a:solidFill>
+              <a:latin typeface="Fira Sans Extra Condensed Medium"/>
+              <a:ea typeface="Fira Sans Extra Condensed Medium"/>
+              <a:cs typeface="Fira Sans Extra Condensed Medium"/>
+              <a:sym typeface="Fira Sans Extra Condensed Medium"/>
+            </a:endParaRPr>
+          </a:p>
+        </p:txBody>
+      </p:sp>
+      <p:sp>
+        <p:nvSpPr>
+          <p:cNvPr id="52" name="Google Shape;732;p22">
+            <a:extLst>
+              <a:ext uri="{FF2B5EF4-FFF2-40B4-BE49-F238E27FC236}">
+                <a16:creationId xmlns:a16="http://schemas.microsoft.com/office/drawing/2014/main" id="{1EDD97CA-C386-CE49-B953-9BE3EA2CC1A4}"/>
+              </a:ext>
+            </a:extLst>
+          </p:cNvPr>
+          <p:cNvSpPr txBox="1"/>
+          <p:nvPr/>
+        </p:nvSpPr>
+        <p:spPr>
+          <a:xfrm>
+            <a:off x="787303" y="5836779"/>
+            <a:ext cx="4599861" cy="597174"/>
+          </a:xfrm>
+          <a:prstGeom prst="rect">
+            <a:avLst/>
+          </a:prstGeom>
+          <a:noFill/>
+          <a:ln>
             <a:noFill/>
-            <a:ln>
-              <a:noFill/>
-            </a:ln>
-          </p:spPr>
-          <p:txBody>
-            <a:bodyPr spcFirstLastPara="1" wrap="square" lIns="121900" tIns="121900" rIns="121900" bIns="121900" anchor="t" anchorCtr="0">
-              <a:noAutofit/>
-            </a:bodyPr>
-            <a:lstStyle/>
-            <a:p>
-              <a:pPr algn="r"/>
-              <a:r>
-                <a:rPr lang="it-IT" sz="1600" dirty="0">
-                  <a:solidFill>
-                    <a:schemeClr val="dk1"/>
-                  </a:solidFill>
-                  <a:latin typeface="Fira Sans"/>
-                  <a:ea typeface="Fira Sans"/>
-                  <a:cs typeface="Fira Sans"/>
-                  <a:sym typeface="Fira Sans"/>
-                </a:rPr>
-                <a:t>Facilita la comunicazione tra sviluppatori e designer, fornendo un linguaggio comune</a:t>
-              </a:r>
-              <a:endParaRPr lang="en-US" sz="2267" dirty="0">
-                <a:latin typeface="Fira Sans Medium"/>
-                <a:ea typeface="Fira Sans Medium"/>
-                <a:cs typeface="Fira Sans Medium"/>
-                <a:sym typeface="Fira Sans Medium"/>
-              </a:endParaRPr>
-            </a:p>
-          </p:txBody>
-        </p:sp>
-        <p:sp>
-          <p:nvSpPr>
-            <p:cNvPr id="53" name="Google Shape;739;p22">
-              <a:extLst>
-                <a:ext uri="{FF2B5EF4-FFF2-40B4-BE49-F238E27FC236}">
-                  <a16:creationId xmlns:a16="http://schemas.microsoft.com/office/drawing/2014/main" id="{01819480-20F2-D58E-851E-D2EDB442D752}"/>
-                </a:ext>
-              </a:extLst>
-            </p:cNvPr>
-            <p:cNvSpPr txBox="1"/>
-            <p:nvPr/>
-          </p:nvSpPr>
-          <p:spPr>
-            <a:xfrm flipH="1">
-              <a:off x="6793327" y="2632789"/>
-              <a:ext cx="3597025" cy="548400"/>
-            </a:xfrm>
-            <a:prstGeom prst="rect">
-              <a:avLst/>
-            </a:prstGeom>
-            <a:noFill/>
-            <a:ln>
-              <a:noFill/>
-            </a:ln>
-          </p:spPr>
-          <p:txBody>
-            <a:bodyPr spcFirstLastPara="1" wrap="square" lIns="121900" tIns="121900" rIns="121900" bIns="121900" anchor="ctr" anchorCtr="0">
-              <a:noAutofit/>
-            </a:bodyPr>
-            <a:lstStyle/>
-            <a:p>
-              <a:r>
-                <a:rPr lang="it-IT" sz="2000" b="1" dirty="0">
-                  <a:latin typeface="Fira Sans Extra Condensed Medium"/>
-                  <a:ea typeface="Fira Sans Extra Condensed Medium"/>
-                  <a:cs typeface="Fira Sans Extra Condensed Medium"/>
-                  <a:sym typeface="Fira Sans Extra Condensed Medium"/>
-                </a:rPr>
-                <a:t>Curva di apprendimento ripida</a:t>
-              </a:r>
-              <a:endParaRPr sz="2000" b="1" dirty="0">
-                <a:solidFill>
-                  <a:srgbClr val="000000"/>
-                </a:solidFill>
-                <a:latin typeface="Fira Sans Extra Condensed Medium"/>
-                <a:ea typeface="Fira Sans Extra Condensed Medium"/>
-                <a:cs typeface="Fira Sans Extra Condensed Medium"/>
-                <a:sym typeface="Fira Sans Extra Condensed Medium"/>
-              </a:endParaRPr>
-            </a:p>
-          </p:txBody>
-        </p:sp>
-        <p:sp>
-          <p:nvSpPr>
-            <p:cNvPr id="54" name="Google Shape;740;p22">
-              <a:extLst>
-                <a:ext uri="{FF2B5EF4-FFF2-40B4-BE49-F238E27FC236}">
-                  <a16:creationId xmlns:a16="http://schemas.microsoft.com/office/drawing/2014/main" id="{87815CF2-89ED-9099-8443-C900AB605216}"/>
-                </a:ext>
-              </a:extLst>
-            </p:cNvPr>
-            <p:cNvSpPr txBox="1"/>
-            <p:nvPr/>
-          </p:nvSpPr>
-          <p:spPr>
-            <a:xfrm flipH="1">
-              <a:off x="6793456" y="3003752"/>
-              <a:ext cx="4470792" cy="548400"/>
-            </a:xfrm>
-            <a:prstGeom prst="rect">
-              <a:avLst/>
-            </a:prstGeom>
-            <a:noFill/>
-            <a:ln>
-              <a:noFill/>
-            </a:ln>
-          </p:spPr>
-          <p:txBody>
-            <a:bodyPr spcFirstLastPara="1" wrap="square" lIns="121900" tIns="121900" rIns="121900" bIns="121900" anchor="t" anchorCtr="0">
-              <a:noAutofit/>
-            </a:bodyPr>
-            <a:lstStyle/>
-            <a:p>
-              <a:r>
-                <a:rPr lang="it-IT" sz="1600" dirty="0">
-                  <a:latin typeface="Fira Sans"/>
-                  <a:ea typeface="Fira Sans"/>
-                  <a:cs typeface="Fira Sans"/>
-                  <a:sym typeface="Fira Sans"/>
-                </a:rPr>
-                <a:t>Presenta una curva di apprendimento ripida, che porta a una generazione meno efficace</a:t>
-              </a:r>
-            </a:p>
-          </p:txBody>
-        </p:sp>
-        <p:sp>
-          <p:nvSpPr>
-            <p:cNvPr id="55" name="Google Shape;741;p22">
-              <a:extLst>
-                <a:ext uri="{FF2B5EF4-FFF2-40B4-BE49-F238E27FC236}">
-                  <a16:creationId xmlns:a16="http://schemas.microsoft.com/office/drawing/2014/main" id="{4AB179CF-E175-FE17-8C6D-4DC21F62CEEA}"/>
-                </a:ext>
-              </a:extLst>
-            </p:cNvPr>
-            <p:cNvSpPr txBox="1"/>
-            <p:nvPr/>
-          </p:nvSpPr>
-          <p:spPr>
-            <a:xfrm flipH="1">
-              <a:off x="6793411" y="4024031"/>
-              <a:ext cx="3785425" cy="548400"/>
-            </a:xfrm>
-            <a:prstGeom prst="rect">
-              <a:avLst/>
-            </a:prstGeom>
-            <a:noFill/>
-            <a:ln>
-              <a:noFill/>
-            </a:ln>
-          </p:spPr>
-          <p:txBody>
-            <a:bodyPr spcFirstLastPara="1" wrap="square" lIns="121900" tIns="121900" rIns="121900" bIns="121900" anchor="ctr" anchorCtr="0">
-              <a:noAutofit/>
-            </a:bodyPr>
-            <a:lstStyle/>
-            <a:p>
-              <a:r>
-                <a:rPr lang="it-IT" sz="2000" b="1" dirty="0">
-                  <a:latin typeface="Fira Sans Extra Condensed Medium"/>
-                  <a:ea typeface="Fira Sans Extra Condensed Medium"/>
-                  <a:cs typeface="Fira Sans Extra Condensed Medium"/>
-                  <a:sym typeface="Fira Sans Extra Condensed Medium"/>
-                </a:rPr>
-                <a:t>Rigidità dei tool</a:t>
-              </a:r>
-              <a:endParaRPr lang="it-IT" sz="2000" b="1" dirty="0">
-                <a:solidFill>
-                  <a:srgbClr val="000000"/>
-                </a:solidFill>
-                <a:latin typeface="Fira Sans Extra Condensed Medium"/>
-                <a:ea typeface="Fira Sans Extra Condensed Medium"/>
-                <a:cs typeface="Fira Sans Extra Condensed Medium"/>
-                <a:sym typeface="Fira Sans Extra Condensed Medium"/>
-              </a:endParaRPr>
-            </a:p>
-          </p:txBody>
-        </p:sp>
-        <p:sp>
-          <p:nvSpPr>
-            <p:cNvPr id="56" name="Google Shape;742;p22">
-              <a:extLst>
-                <a:ext uri="{FF2B5EF4-FFF2-40B4-BE49-F238E27FC236}">
-                  <a16:creationId xmlns:a16="http://schemas.microsoft.com/office/drawing/2014/main" id="{3CB3926C-0290-F1B1-3402-1690B9D5EC68}"/>
-                </a:ext>
-              </a:extLst>
-            </p:cNvPr>
-            <p:cNvSpPr txBox="1"/>
-            <p:nvPr/>
-          </p:nvSpPr>
-          <p:spPr>
-            <a:xfrm flipH="1">
-              <a:off x="6793243" y="4394983"/>
-              <a:ext cx="4471003" cy="548400"/>
-            </a:xfrm>
-            <a:prstGeom prst="rect">
-              <a:avLst/>
-            </a:prstGeom>
-            <a:noFill/>
-            <a:ln>
-              <a:noFill/>
-            </a:ln>
-          </p:spPr>
-          <p:txBody>
-            <a:bodyPr spcFirstLastPara="1" wrap="square" lIns="121900" tIns="121900" rIns="121900" bIns="121900" anchor="t" anchorCtr="0">
-              <a:noAutofit/>
-            </a:bodyPr>
-            <a:lstStyle/>
-            <a:p>
-              <a:r>
-                <a:rPr lang="it-IT" sz="1600" dirty="0">
-                  <a:solidFill>
-                    <a:schemeClr val="dk1"/>
-                  </a:solidFill>
-                  <a:latin typeface="Fira Sans"/>
-                  <a:ea typeface="Fira Sans"/>
-                  <a:cs typeface="Fira Sans"/>
-                  <a:sym typeface="Fira Sans"/>
-                </a:rPr>
-                <a:t>Adattarsi a nuovi tool richiede molti sforzi per apprenderne le regole e la sintassi</a:t>
-              </a:r>
-              <a:endParaRPr lang="en-US" sz="1600" dirty="0">
+          </a:ln>
+        </p:spPr>
+        <p:txBody>
+          <a:bodyPr spcFirstLastPara="1" wrap="square" lIns="121900" tIns="121900" rIns="121900" bIns="121900" anchor="t" anchorCtr="0">
+            <a:noAutofit/>
+          </a:bodyPr>
+          <a:lstStyle/>
+          <a:p>
+            <a:pPr algn="r"/>
+            <a:r>
+              <a:rPr lang="it-IT" sz="1600" dirty="0">
                 <a:solidFill>
                   <a:schemeClr val="dk1"/>
                 </a:solidFill>
@@ -18650,61 +18420,260 @@
                 <a:ea typeface="Fira Sans"/>
                 <a:cs typeface="Fira Sans"/>
                 <a:sym typeface="Fira Sans"/>
-              </a:endParaRPr>
-            </a:p>
-          </p:txBody>
-        </p:sp>
-        <p:sp>
-          <p:nvSpPr>
-            <p:cNvPr id="57" name="Google Shape;720;p22">
-              <a:extLst>
-                <a:ext uri="{FF2B5EF4-FFF2-40B4-BE49-F238E27FC236}">
-                  <a16:creationId xmlns:a16="http://schemas.microsoft.com/office/drawing/2014/main" id="{E5EEDDD2-D2EA-2F2F-EBC0-D290095C619A}"/>
-                </a:ext>
-              </a:extLst>
-            </p:cNvPr>
-            <p:cNvSpPr/>
-            <p:nvPr/>
-          </p:nvSpPr>
-          <p:spPr>
-            <a:xfrm>
-              <a:off x="626850" y="1728216"/>
-              <a:ext cx="4977725" cy="644400"/>
-            </a:xfrm>
-            <a:prstGeom prst="roundRect">
-              <a:avLst>
-                <a:gd name="adj" fmla="val 22134"/>
-              </a:avLst>
-            </a:prstGeom>
+              </a:rPr>
+              <a:t>Facilita la comunicazione tra sviluppatori e designer, fornendo un linguaggio comune</a:t>
+            </a:r>
+            <a:endParaRPr lang="en-US" sz="2267" dirty="0">
+              <a:latin typeface="Fira Sans Medium"/>
+              <a:ea typeface="Fira Sans Medium"/>
+              <a:cs typeface="Fira Sans Medium"/>
+              <a:sym typeface="Fira Sans Medium"/>
+            </a:endParaRPr>
+          </a:p>
+        </p:txBody>
+      </p:sp>
+      <p:sp>
+        <p:nvSpPr>
+          <p:cNvPr id="53" name="Google Shape;739;p22">
+            <a:extLst>
+              <a:ext uri="{FF2B5EF4-FFF2-40B4-BE49-F238E27FC236}">
+                <a16:creationId xmlns:a16="http://schemas.microsoft.com/office/drawing/2014/main" id="{01819480-20F2-D58E-851E-D2EDB442D752}"/>
+              </a:ext>
+            </a:extLst>
+          </p:cNvPr>
+          <p:cNvSpPr txBox="1"/>
+          <p:nvPr/>
+        </p:nvSpPr>
+        <p:spPr>
+          <a:xfrm flipH="1">
+            <a:off x="6804563" y="2592083"/>
+            <a:ext cx="3700982" cy="564249"/>
+          </a:xfrm>
+          <a:prstGeom prst="rect">
+            <a:avLst/>
+          </a:prstGeom>
+          <a:noFill/>
+          <a:ln>
+            <a:noFill/>
+          </a:ln>
+        </p:spPr>
+        <p:txBody>
+          <a:bodyPr spcFirstLastPara="1" wrap="square" lIns="121900" tIns="121900" rIns="121900" bIns="121900" anchor="ctr" anchorCtr="0">
+            <a:noAutofit/>
+          </a:bodyPr>
+          <a:lstStyle/>
+          <a:p>
+            <a:r>
+              <a:rPr lang="it-IT" sz="2000" b="1" dirty="0">
+                <a:latin typeface="Fira Sans Extra Condensed Medium"/>
+                <a:ea typeface="Fira Sans Extra Condensed Medium"/>
+                <a:cs typeface="Fira Sans Extra Condensed Medium"/>
+                <a:sym typeface="Fira Sans Extra Condensed Medium"/>
+              </a:rPr>
+              <a:t>Curva di apprendimento ripida</a:t>
+            </a:r>
+            <a:endParaRPr sz="2000" b="1" dirty="0">
+              <a:solidFill>
+                <a:srgbClr val="000000"/>
+              </a:solidFill>
+              <a:latin typeface="Fira Sans Extra Condensed Medium"/>
+              <a:ea typeface="Fira Sans Extra Condensed Medium"/>
+              <a:cs typeface="Fira Sans Extra Condensed Medium"/>
+              <a:sym typeface="Fira Sans Extra Condensed Medium"/>
+            </a:endParaRPr>
+          </a:p>
+        </p:txBody>
+      </p:sp>
+      <p:sp>
+        <p:nvSpPr>
+          <p:cNvPr id="54" name="Google Shape;740;p22">
+            <a:extLst>
+              <a:ext uri="{FF2B5EF4-FFF2-40B4-BE49-F238E27FC236}">
+                <a16:creationId xmlns:a16="http://schemas.microsoft.com/office/drawing/2014/main" id="{87815CF2-89ED-9099-8443-C900AB605216}"/>
+              </a:ext>
+            </a:extLst>
+          </p:cNvPr>
+          <p:cNvSpPr txBox="1"/>
+          <p:nvPr/>
+        </p:nvSpPr>
+        <p:spPr>
+          <a:xfrm flipH="1">
+            <a:off x="6804696" y="2973767"/>
+            <a:ext cx="4600002" cy="564249"/>
+          </a:xfrm>
+          <a:prstGeom prst="rect">
+            <a:avLst/>
+          </a:prstGeom>
+          <a:noFill/>
+          <a:ln>
+            <a:noFill/>
+          </a:ln>
+        </p:spPr>
+        <p:txBody>
+          <a:bodyPr spcFirstLastPara="1" wrap="square" lIns="121900" tIns="121900" rIns="121900" bIns="121900" anchor="t" anchorCtr="0">
+            <a:noAutofit/>
+          </a:bodyPr>
+          <a:lstStyle/>
+          <a:p>
+            <a:r>
+              <a:rPr lang="it-IT" sz="1600" dirty="0">
+                <a:latin typeface="Fira Sans"/>
+                <a:ea typeface="Fira Sans"/>
+                <a:cs typeface="Fira Sans"/>
+                <a:sym typeface="Fira Sans"/>
+              </a:rPr>
+              <a:t>Presenta una curva di apprendimento ripida, che porta a una generazione meno efficace</a:t>
+            </a:r>
+          </a:p>
+        </p:txBody>
+      </p:sp>
+      <p:sp>
+        <p:nvSpPr>
+          <p:cNvPr id="55" name="Google Shape;741;p22">
+            <a:extLst>
+              <a:ext uri="{FF2B5EF4-FFF2-40B4-BE49-F238E27FC236}">
+                <a16:creationId xmlns:a16="http://schemas.microsoft.com/office/drawing/2014/main" id="{4AB179CF-E175-FE17-8C6D-4DC21F62CEEA}"/>
+              </a:ext>
+            </a:extLst>
+          </p:cNvPr>
+          <p:cNvSpPr txBox="1"/>
+          <p:nvPr/>
+        </p:nvSpPr>
+        <p:spPr>
+          <a:xfrm flipH="1">
+            <a:off x="6804650" y="4023533"/>
+            <a:ext cx="3894827" cy="564249"/>
+          </a:xfrm>
+          <a:prstGeom prst="rect">
+            <a:avLst/>
+          </a:prstGeom>
+          <a:noFill/>
+          <a:ln>
+            <a:noFill/>
+          </a:ln>
+        </p:spPr>
+        <p:txBody>
+          <a:bodyPr spcFirstLastPara="1" wrap="square" lIns="121900" tIns="121900" rIns="121900" bIns="121900" anchor="ctr" anchorCtr="0">
+            <a:noAutofit/>
+          </a:bodyPr>
+          <a:lstStyle/>
+          <a:p>
+            <a:r>
+              <a:rPr lang="it-IT" sz="2000" b="1" dirty="0">
+                <a:latin typeface="Fira Sans Extra Condensed Medium"/>
+                <a:ea typeface="Fira Sans Extra Condensed Medium"/>
+                <a:cs typeface="Fira Sans Extra Condensed Medium"/>
+                <a:sym typeface="Fira Sans Extra Condensed Medium"/>
+              </a:rPr>
+              <a:t>Rigidità dei tool</a:t>
+            </a:r>
+            <a:endParaRPr lang="it-IT" sz="2000" b="1" dirty="0">
+              <a:solidFill>
+                <a:srgbClr val="000000"/>
+              </a:solidFill>
+              <a:latin typeface="Fira Sans Extra Condensed Medium"/>
+              <a:ea typeface="Fira Sans Extra Condensed Medium"/>
+              <a:cs typeface="Fira Sans Extra Condensed Medium"/>
+              <a:sym typeface="Fira Sans Extra Condensed Medium"/>
+            </a:endParaRPr>
+          </a:p>
+        </p:txBody>
+      </p:sp>
+      <p:sp>
+        <p:nvSpPr>
+          <p:cNvPr id="56" name="Google Shape;742;p22">
+            <a:extLst>
+              <a:ext uri="{FF2B5EF4-FFF2-40B4-BE49-F238E27FC236}">
+                <a16:creationId xmlns:a16="http://schemas.microsoft.com/office/drawing/2014/main" id="{3CB3926C-0290-F1B1-3402-1690B9D5EC68}"/>
+              </a:ext>
+            </a:extLst>
+          </p:cNvPr>
+          <p:cNvSpPr txBox="1"/>
+          <p:nvPr/>
+        </p:nvSpPr>
+        <p:spPr>
+          <a:xfrm flipH="1">
+            <a:off x="6804477" y="4405206"/>
+            <a:ext cx="4600219" cy="564249"/>
+          </a:xfrm>
+          <a:prstGeom prst="rect">
+            <a:avLst/>
+          </a:prstGeom>
+          <a:noFill/>
+          <a:ln>
+            <a:noFill/>
+          </a:ln>
+        </p:spPr>
+        <p:txBody>
+          <a:bodyPr spcFirstLastPara="1" wrap="square" lIns="121900" tIns="121900" rIns="121900" bIns="121900" anchor="t" anchorCtr="0">
+            <a:noAutofit/>
+          </a:bodyPr>
+          <a:lstStyle/>
+          <a:p>
+            <a:r>
+              <a:rPr lang="it-IT" sz="1600" dirty="0">
+                <a:solidFill>
+                  <a:schemeClr val="dk1"/>
+                </a:solidFill>
+                <a:latin typeface="Fira Sans"/>
+                <a:ea typeface="Fira Sans"/>
+                <a:cs typeface="Fira Sans"/>
+                <a:sym typeface="Fira Sans"/>
+              </a:rPr>
+              <a:t>Adattarsi a nuovi tool richiede molti sforzi per apprenderne le regole e la sintassi</a:t>
+            </a:r>
+            <a:endParaRPr lang="en-US" sz="1600" dirty="0">
+              <a:solidFill>
+                <a:schemeClr val="dk1"/>
+              </a:solidFill>
+              <a:latin typeface="Fira Sans"/>
+              <a:ea typeface="Fira Sans"/>
+              <a:cs typeface="Fira Sans"/>
+              <a:sym typeface="Fira Sans"/>
+            </a:endParaRPr>
+          </a:p>
+        </p:txBody>
+      </p:sp>
+      <p:sp>
+        <p:nvSpPr>
+          <p:cNvPr id="57" name="Google Shape;720;p22">
+            <a:extLst>
+              <a:ext uri="{FF2B5EF4-FFF2-40B4-BE49-F238E27FC236}">
+                <a16:creationId xmlns:a16="http://schemas.microsoft.com/office/drawing/2014/main" id="{E5EEDDD2-D2EA-2F2F-EBC0-D290095C619A}"/>
+              </a:ext>
+            </a:extLst>
+          </p:cNvPr>
+          <p:cNvSpPr/>
+          <p:nvPr/>
+        </p:nvSpPr>
+        <p:spPr>
+          <a:xfrm>
+            <a:off x="459870" y="1661367"/>
+            <a:ext cx="5121585" cy="663024"/>
+          </a:xfrm>
+          <a:prstGeom prst="roundRect">
+            <a:avLst>
+              <a:gd name="adj" fmla="val 22134"/>
+            </a:avLst>
+          </a:prstGeom>
+          <a:solidFill>
+            <a:schemeClr val="accent4"/>
+          </a:solidFill>
+          <a:ln>
             <a:solidFill>
               <a:schemeClr val="accent4"/>
             </a:solidFill>
-            <a:ln>
-              <a:solidFill>
-                <a:schemeClr val="accent4"/>
-              </a:solidFill>
-            </a:ln>
-          </p:spPr>
-          <p:txBody>
-            <a:bodyPr spcFirstLastPara="1" wrap="square" lIns="121900" tIns="121900" rIns="121900" bIns="121900" anchor="ctr" anchorCtr="0">
-              <a:noAutofit/>
-            </a:bodyPr>
-            <a:lstStyle/>
-            <a:p>
-              <a:pPr algn="ctr"/>
-              <a:r>
-                <a:rPr lang="en" sz="2667" b="1" dirty="0">
-                  <a:solidFill>
-                    <a:schemeClr val="lt1"/>
-                  </a:solidFill>
-                  <a:latin typeface="Fira Sans Extra Condensed"/>
-                  <a:ea typeface="Fira Sans Extra Condensed"/>
-                  <a:cs typeface="Fira Sans Extra Condensed"/>
-                  <a:sym typeface="Fira Sans Extra Condensed"/>
-                </a:rPr>
-                <a:t>YARC</a:t>
-              </a:r>
-              <a:endParaRPr sz="2667" b="1" dirty="0">
+          </a:ln>
+        </p:spPr>
+        <p:txBody>
+          <a:bodyPr spcFirstLastPara="1" wrap="square" lIns="121900" tIns="121900" rIns="121900" bIns="121900" anchor="ctr" anchorCtr="0">
+            <a:noAutofit/>
+          </a:bodyPr>
+          <a:lstStyle/>
+          <a:p>
+            <a:pPr algn="ctr"/>
+            <a:r>
+              <a:rPr lang="en" sz="2667" b="1" dirty="0">
                 <a:solidFill>
                   <a:schemeClr val="lt1"/>
                 </a:solidFill>
@@ -18712,94 +18681,94 @@
                 <a:ea typeface="Fira Sans Extra Condensed"/>
                 <a:cs typeface="Fira Sans Extra Condensed"/>
                 <a:sym typeface="Fira Sans Extra Condensed"/>
-              </a:endParaRPr>
-            </a:p>
-          </p:txBody>
-        </p:sp>
-        <p:cxnSp>
-          <p:nvCxnSpPr>
-            <p:cNvPr id="58" name="Google Shape;745;p22">
-              <a:extLst>
-                <a:ext uri="{FF2B5EF4-FFF2-40B4-BE49-F238E27FC236}">
-                  <a16:creationId xmlns:a16="http://schemas.microsoft.com/office/drawing/2014/main" id="{50902B08-9081-12A7-FD9D-98945090D00C}"/>
-                </a:ext>
-              </a:extLst>
-            </p:cNvPr>
-            <p:cNvCxnSpPr>
-              <a:cxnSpLocks/>
-              <a:stCxn id="59" idx="3"/>
-            </p:cNvCxnSpPr>
-            <p:nvPr/>
-          </p:nvCxnSpPr>
-          <p:spPr>
-            <a:xfrm flipH="1">
-              <a:off x="6261701" y="2050416"/>
-              <a:ext cx="343057" cy="4490000"/>
-            </a:xfrm>
-            <a:prstGeom prst="bentConnector2">
-              <a:avLst/>
-            </a:prstGeom>
-            <a:noFill/>
-            <a:ln w="38100" cap="flat" cmpd="sng">
+              </a:rPr>
+              <a:t>YARC</a:t>
+            </a:r>
+            <a:endParaRPr sz="2667" b="1" dirty="0">
               <a:solidFill>
-                <a:schemeClr val="accent2"/>
+                <a:schemeClr val="lt1"/>
               </a:solidFill>
-              <a:prstDash val="solid"/>
-              <a:round/>
-              <a:headEnd type="none" w="med" len="med"/>
-              <a:tailEnd type="oval" w="med" len="med"/>
-            </a:ln>
-          </p:spPr>
-        </p:cxnSp>
-        <p:sp>
-          <p:nvSpPr>
-            <p:cNvPr id="59" name="Google Shape;746;p22">
-              <a:extLst>
-                <a:ext uri="{FF2B5EF4-FFF2-40B4-BE49-F238E27FC236}">
-                  <a16:creationId xmlns:a16="http://schemas.microsoft.com/office/drawing/2014/main" id="{74799F6B-53CE-1DB7-85CD-9790DEEB2333}"/>
-                </a:ext>
-              </a:extLst>
-            </p:cNvPr>
-            <p:cNvSpPr/>
-            <p:nvPr/>
-          </p:nvSpPr>
-          <p:spPr>
-            <a:xfrm flipH="1">
-              <a:off x="6604758" y="1728216"/>
-              <a:ext cx="4977725" cy="644400"/>
-            </a:xfrm>
-            <a:prstGeom prst="roundRect">
-              <a:avLst>
-                <a:gd name="adj" fmla="val 22134"/>
-              </a:avLst>
-            </a:prstGeom>
+              <a:latin typeface="Fira Sans Extra Condensed"/>
+              <a:ea typeface="Fira Sans Extra Condensed"/>
+              <a:cs typeface="Fira Sans Extra Condensed"/>
+              <a:sym typeface="Fira Sans Extra Condensed"/>
+            </a:endParaRPr>
+          </a:p>
+        </p:txBody>
+      </p:sp>
+      <p:cxnSp>
+        <p:nvCxnSpPr>
+          <p:cNvPr id="58" name="Google Shape;745;p22">
+            <a:extLst>
+              <a:ext uri="{FF2B5EF4-FFF2-40B4-BE49-F238E27FC236}">
+                <a16:creationId xmlns:a16="http://schemas.microsoft.com/office/drawing/2014/main" id="{50902B08-9081-12A7-FD9D-98945090D00C}"/>
+              </a:ext>
+            </a:extLst>
+          </p:cNvPr>
+          <p:cNvCxnSpPr>
+            <a:cxnSpLocks/>
+            <a:stCxn id="59" idx="3"/>
+          </p:cNvCxnSpPr>
+          <p:nvPr/>
+        </p:nvCxnSpPr>
+        <p:spPr>
+          <a:xfrm flipH="1">
+            <a:off x="6257573" y="1992879"/>
+            <a:ext cx="352972" cy="4619765"/>
+          </a:xfrm>
+          <a:prstGeom prst="bentConnector2">
+            <a:avLst/>
+          </a:prstGeom>
+          <a:noFill/>
+          <a:ln w="38100" cap="flat" cmpd="sng">
             <a:solidFill>
               <a:schemeClr val="accent2"/>
             </a:solidFill>
-            <a:ln>
-              <a:noFill/>
-            </a:ln>
-          </p:spPr>
-          <p:txBody>
-            <a:bodyPr spcFirstLastPara="1" wrap="square" lIns="121900" tIns="121900" rIns="121900" bIns="121900" anchor="ctr" anchorCtr="0">
-              <a:noAutofit/>
-            </a:bodyPr>
-            <a:lstStyle/>
-            <a:p>
-              <a:pPr algn="ctr"/>
-              <a:r>
-                <a:rPr lang="en" sz="2667" b="1" dirty="0">
-                  <a:solidFill>
-                    <a:schemeClr val="lt1"/>
-                  </a:solidFill>
-                  <a:latin typeface="Fira Sans Extra Condensed"/>
-                  <a:ea typeface="Fira Sans Extra Condensed"/>
-                  <a:cs typeface="Fira Sans Extra Condensed"/>
-                  <a:sym typeface="Fira Sans Extra Condensed"/>
-                </a:rPr>
-                <a:t>Legacy SDG Tool</a:t>
-              </a:r>
-              <a:endParaRPr sz="2667" b="1" dirty="0">
+            <a:prstDash val="solid"/>
+            <a:round/>
+            <a:headEnd type="none" w="med" len="med"/>
+            <a:tailEnd type="oval" w="med" len="med"/>
+          </a:ln>
+        </p:spPr>
+      </p:cxnSp>
+      <p:sp>
+        <p:nvSpPr>
+          <p:cNvPr id="59" name="Google Shape;746;p22">
+            <a:extLst>
+              <a:ext uri="{FF2B5EF4-FFF2-40B4-BE49-F238E27FC236}">
+                <a16:creationId xmlns:a16="http://schemas.microsoft.com/office/drawing/2014/main" id="{74799F6B-53CE-1DB7-85CD-9790DEEB2333}"/>
+              </a:ext>
+            </a:extLst>
+          </p:cNvPr>
+          <p:cNvSpPr/>
+          <p:nvPr/>
+        </p:nvSpPr>
+        <p:spPr>
+          <a:xfrm flipH="1">
+            <a:off x="6610545" y="1661367"/>
+            <a:ext cx="5121585" cy="663024"/>
+          </a:xfrm>
+          <a:prstGeom prst="roundRect">
+            <a:avLst>
+              <a:gd name="adj" fmla="val 22134"/>
+            </a:avLst>
+          </a:prstGeom>
+          <a:solidFill>
+            <a:schemeClr val="accent2"/>
+          </a:solidFill>
+          <a:ln>
+            <a:noFill/>
+          </a:ln>
+        </p:spPr>
+        <p:txBody>
+          <a:bodyPr spcFirstLastPara="1" wrap="square" lIns="121900" tIns="121900" rIns="121900" bIns="121900" anchor="ctr" anchorCtr="0">
+            <a:noAutofit/>
+          </a:bodyPr>
+          <a:lstStyle/>
+          <a:p>
+            <a:pPr algn="ctr"/>
+            <a:r>
+              <a:rPr lang="en" sz="2667" b="1" dirty="0">
                 <a:solidFill>
                   <a:schemeClr val="lt1"/>
                 </a:solidFill>
@@ -18807,145 +18776,145 @@
                 <a:ea typeface="Fira Sans Extra Condensed"/>
                 <a:cs typeface="Fira Sans Extra Condensed"/>
                 <a:sym typeface="Fira Sans Extra Condensed"/>
-              </a:endParaRPr>
-            </a:p>
-          </p:txBody>
-        </p:sp>
-        <p:sp>
-          <p:nvSpPr>
-            <p:cNvPr id="5" name="Google Shape;724;p22">
-              <a:extLst>
-                <a:ext uri="{FF2B5EF4-FFF2-40B4-BE49-F238E27FC236}">
-                  <a16:creationId xmlns:a16="http://schemas.microsoft.com/office/drawing/2014/main" id="{FF569D3E-8A8D-57D5-699C-5BE4DE01EE7B}"/>
-                </a:ext>
-              </a:extLst>
-            </p:cNvPr>
-            <p:cNvSpPr/>
-            <p:nvPr/>
-          </p:nvSpPr>
-          <p:spPr>
-            <a:xfrm>
-              <a:off x="6590708" y="5305469"/>
-              <a:ext cx="4977723" cy="1241200"/>
-            </a:xfrm>
-            <a:prstGeom prst="roundRect">
-              <a:avLst>
-                <a:gd name="adj" fmla="val 22134"/>
-              </a:avLst>
-            </a:prstGeom>
-            <a:solidFill>
-              <a:schemeClr val="lt2"/>
-            </a:solidFill>
-            <a:ln>
-              <a:noFill/>
-            </a:ln>
-          </p:spPr>
-          <p:txBody>
-            <a:bodyPr spcFirstLastPara="1" wrap="square" lIns="121900" tIns="121900" rIns="121900" bIns="121900" anchor="ctr" anchorCtr="0">
-              <a:noAutofit/>
-            </a:bodyPr>
-            <a:lstStyle/>
-            <a:p>
-              <a:endParaRPr sz="2400"/>
-            </a:p>
-          </p:txBody>
-        </p:sp>
-        <p:sp>
-          <p:nvSpPr>
-            <p:cNvPr id="6" name="Google Shape;741;p22">
-              <a:extLst>
-                <a:ext uri="{FF2B5EF4-FFF2-40B4-BE49-F238E27FC236}">
-                  <a16:creationId xmlns:a16="http://schemas.microsoft.com/office/drawing/2014/main" id="{46D99D9A-FEAA-DFAB-355F-52A2C351C1CE}"/>
-                </a:ext>
-              </a:extLst>
-            </p:cNvPr>
-            <p:cNvSpPr txBox="1"/>
-            <p:nvPr/>
-          </p:nvSpPr>
-          <p:spPr>
-            <a:xfrm flipH="1">
-              <a:off x="6779362" y="5415360"/>
-              <a:ext cx="3785425" cy="548400"/>
-            </a:xfrm>
-            <a:prstGeom prst="rect">
-              <a:avLst/>
-            </a:prstGeom>
+              </a:rPr>
+              <a:t>Legacy SDG Tool</a:t>
+            </a:r>
+            <a:endParaRPr sz="2667" b="1" dirty="0">
+              <a:solidFill>
+                <a:schemeClr val="lt1"/>
+              </a:solidFill>
+              <a:latin typeface="Fira Sans Extra Condensed"/>
+              <a:ea typeface="Fira Sans Extra Condensed"/>
+              <a:cs typeface="Fira Sans Extra Condensed"/>
+              <a:sym typeface="Fira Sans Extra Condensed"/>
+            </a:endParaRPr>
+          </a:p>
+        </p:txBody>
+      </p:sp>
+      <p:sp>
+        <p:nvSpPr>
+          <p:cNvPr id="5" name="Google Shape;724;p22">
+            <a:extLst>
+              <a:ext uri="{FF2B5EF4-FFF2-40B4-BE49-F238E27FC236}">
+                <a16:creationId xmlns:a16="http://schemas.microsoft.com/office/drawing/2014/main" id="{FF569D3E-8A8D-57D5-699C-5BE4DE01EE7B}"/>
+              </a:ext>
+            </a:extLst>
+          </p:cNvPr>
+          <p:cNvSpPr/>
+          <p:nvPr/>
+        </p:nvSpPr>
+        <p:spPr>
+          <a:xfrm>
+            <a:off x="6596089" y="5342005"/>
+            <a:ext cx="5121583" cy="1277072"/>
+          </a:xfrm>
+          <a:prstGeom prst="roundRect">
+            <a:avLst>
+              <a:gd name="adj" fmla="val 22134"/>
+            </a:avLst>
+          </a:prstGeom>
+          <a:solidFill>
+            <a:schemeClr val="lt2"/>
+          </a:solidFill>
+          <a:ln>
             <a:noFill/>
-            <a:ln>
-              <a:noFill/>
-            </a:ln>
-          </p:spPr>
-          <p:txBody>
-            <a:bodyPr spcFirstLastPara="1" wrap="square" lIns="121900" tIns="121900" rIns="121900" bIns="121900" anchor="ctr" anchorCtr="0">
-              <a:noAutofit/>
-            </a:bodyPr>
-            <a:lstStyle/>
-            <a:p>
-              <a:r>
-                <a:rPr lang="it-IT" sz="2000" b="1" dirty="0">
-                  <a:latin typeface="Fira Sans Extra Condensed Medium"/>
-                  <a:ea typeface="Fira Sans Extra Condensed Medium"/>
-                  <a:cs typeface="Fira Sans Extra Condensed Medium"/>
-                  <a:sym typeface="Fira Sans Extra Condensed Medium"/>
-                </a:rPr>
-                <a:t>Mancanza di un terreno comune</a:t>
-              </a:r>
-              <a:endParaRPr lang="it-IT" sz="2000" b="1" dirty="0">
-                <a:solidFill>
-                  <a:srgbClr val="000000"/>
-                </a:solidFill>
+          </a:ln>
+        </p:spPr>
+        <p:txBody>
+          <a:bodyPr spcFirstLastPara="1" wrap="square" lIns="121900" tIns="121900" rIns="121900" bIns="121900" anchor="ctr" anchorCtr="0">
+            <a:noAutofit/>
+          </a:bodyPr>
+          <a:lstStyle/>
+          <a:p>
+            <a:endParaRPr sz="2400"/>
+          </a:p>
+        </p:txBody>
+      </p:sp>
+      <p:sp>
+        <p:nvSpPr>
+          <p:cNvPr id="6" name="Google Shape;741;p22">
+            <a:extLst>
+              <a:ext uri="{FF2B5EF4-FFF2-40B4-BE49-F238E27FC236}">
+                <a16:creationId xmlns:a16="http://schemas.microsoft.com/office/drawing/2014/main" id="{46D99D9A-FEAA-DFAB-355F-52A2C351C1CE}"/>
+              </a:ext>
+            </a:extLst>
+          </p:cNvPr>
+          <p:cNvSpPr txBox="1"/>
+          <p:nvPr/>
+        </p:nvSpPr>
+        <p:spPr>
+          <a:xfrm flipH="1">
+            <a:off x="6790194" y="5455072"/>
+            <a:ext cx="4017713" cy="564249"/>
+          </a:xfrm>
+          <a:prstGeom prst="rect">
+            <a:avLst/>
+          </a:prstGeom>
+          <a:noFill/>
+          <a:ln>
+            <a:noFill/>
+          </a:ln>
+        </p:spPr>
+        <p:txBody>
+          <a:bodyPr spcFirstLastPara="1" wrap="square" lIns="121900" tIns="121900" rIns="121900" bIns="121900" anchor="ctr" anchorCtr="0">
+            <a:noAutofit/>
+          </a:bodyPr>
+          <a:lstStyle/>
+          <a:p>
+            <a:r>
+              <a:rPr lang="it-IT" sz="2000" b="1" dirty="0">
                 <a:latin typeface="Fira Sans Extra Condensed Medium"/>
                 <a:ea typeface="Fira Sans Extra Condensed Medium"/>
                 <a:cs typeface="Fira Sans Extra Condensed Medium"/>
                 <a:sym typeface="Fira Sans Extra Condensed Medium"/>
-              </a:endParaRPr>
-            </a:p>
-          </p:txBody>
-        </p:sp>
-        <p:sp>
-          <p:nvSpPr>
-            <p:cNvPr id="8" name="Google Shape;742;p22">
-              <a:extLst>
-                <a:ext uri="{FF2B5EF4-FFF2-40B4-BE49-F238E27FC236}">
-                  <a16:creationId xmlns:a16="http://schemas.microsoft.com/office/drawing/2014/main" id="{8134DD23-C916-DA18-F339-CD044826CE7C}"/>
-                </a:ext>
-              </a:extLst>
-            </p:cNvPr>
-            <p:cNvSpPr txBox="1"/>
-            <p:nvPr/>
-          </p:nvSpPr>
-          <p:spPr>
-            <a:xfrm flipH="1">
-              <a:off x="6779193" y="5786312"/>
-              <a:ext cx="4504502" cy="548400"/>
-            </a:xfrm>
-            <a:prstGeom prst="rect">
-              <a:avLst/>
-            </a:prstGeom>
+              </a:rPr>
+              <a:t>Mancanza di un linguaggio comune</a:t>
+            </a:r>
+            <a:endParaRPr lang="it-IT" sz="2000" b="1" dirty="0">
+              <a:solidFill>
+                <a:srgbClr val="000000"/>
+              </a:solidFill>
+              <a:latin typeface="Fira Sans Extra Condensed Medium"/>
+              <a:ea typeface="Fira Sans Extra Condensed Medium"/>
+              <a:cs typeface="Fira Sans Extra Condensed Medium"/>
+              <a:sym typeface="Fira Sans Extra Condensed Medium"/>
+            </a:endParaRPr>
+          </a:p>
+        </p:txBody>
+      </p:sp>
+      <p:sp>
+        <p:nvSpPr>
+          <p:cNvPr id="8" name="Google Shape;742;p22">
+            <a:extLst>
+              <a:ext uri="{FF2B5EF4-FFF2-40B4-BE49-F238E27FC236}">
+                <a16:creationId xmlns:a16="http://schemas.microsoft.com/office/drawing/2014/main" id="{8134DD23-C916-DA18-F339-CD044826CE7C}"/>
+              </a:ext>
+            </a:extLst>
+          </p:cNvPr>
+          <p:cNvSpPr txBox="1"/>
+          <p:nvPr/>
+        </p:nvSpPr>
+        <p:spPr>
+          <a:xfrm flipH="1">
+            <a:off x="6790021" y="5836745"/>
+            <a:ext cx="4634686" cy="564249"/>
+          </a:xfrm>
+          <a:prstGeom prst="rect">
+            <a:avLst/>
+          </a:prstGeom>
+          <a:noFill/>
+          <a:ln>
             <a:noFill/>
-            <a:ln>
-              <a:noFill/>
-            </a:ln>
-          </p:spPr>
-          <p:txBody>
-            <a:bodyPr spcFirstLastPara="1" wrap="square" lIns="121900" tIns="121900" rIns="121900" bIns="121900" anchor="t" anchorCtr="0">
-              <a:noAutofit/>
-            </a:bodyPr>
-            <a:lstStyle/>
-            <a:p>
-              <a:r>
-                <a:rPr lang="it-IT" sz="1600" dirty="0">
-                  <a:solidFill>
-                    <a:schemeClr val="dk1"/>
-                  </a:solidFill>
-                  <a:latin typeface="Fira Sans"/>
-                  <a:ea typeface="Fira Sans"/>
-                  <a:cs typeface="Fira Sans"/>
-                  <a:sym typeface="Fira Sans"/>
-                </a:rPr>
-                <a:t>Non esiste un linguaggio comune, il che porta a inefficienze nel coordinamento del team</a:t>
-              </a:r>
-              <a:endParaRPr lang="en-US" sz="1600" dirty="0">
+          </a:ln>
+        </p:spPr>
+        <p:txBody>
+          <a:bodyPr spcFirstLastPara="1" wrap="square" lIns="121900" tIns="121900" rIns="121900" bIns="121900" anchor="t" anchorCtr="0">
+            <a:noAutofit/>
+          </a:bodyPr>
+          <a:lstStyle/>
+          <a:p>
+            <a:r>
+              <a:rPr lang="it-IT" sz="1600" dirty="0">
                 <a:solidFill>
                   <a:schemeClr val="dk1"/>
                 </a:solidFill>
@@ -18953,11 +18922,21 @@
                 <a:ea typeface="Fira Sans"/>
                 <a:cs typeface="Fira Sans"/>
                 <a:sym typeface="Fira Sans"/>
-              </a:endParaRPr>
-            </a:p>
-          </p:txBody>
-        </p:sp>
-      </p:grpSp>
+              </a:rPr>
+              <a:t>Non esiste un linguaggio comune, il che porta a inefficienze nel coordinamento del team</a:t>
+            </a:r>
+            <a:endParaRPr lang="en-US" sz="1600" dirty="0">
+              <a:solidFill>
+                <a:schemeClr val="dk1"/>
+              </a:solidFill>
+              <a:latin typeface="Fira Sans"/>
+              <a:ea typeface="Fira Sans"/>
+              <a:cs typeface="Fira Sans"/>
+              <a:sym typeface="Fira Sans"/>
+            </a:endParaRPr>
+          </a:p>
+        </p:txBody>
+      </p:sp>
     </p:spTree>
     <p:extLst>
       <p:ext uri="{BB962C8B-B14F-4D97-AF65-F5344CB8AC3E}">
@@ -18980,6 +18959,1800 @@
       </p:transition>
     </mc:Fallback>
   </mc:AlternateContent>
+  <p:timing>
+    <p:tnLst>
+      <p:par>
+        <p:cTn id="1" dur="indefinite" restart="never" nodeType="tmRoot">
+          <p:childTnLst>
+            <p:seq concurrent="1" nextAc="seek">
+              <p:cTn id="2" dur="indefinite" nodeType="mainSeq">
+                <p:childTnLst>
+                  <p:par>
+                    <p:cTn id="3" fill="hold">
+                      <p:stCondLst>
+                        <p:cond delay="indefinite"/>
+                      </p:stCondLst>
+                      <p:childTnLst>
+                        <p:par>
+                          <p:cTn id="4" fill="hold">
+                            <p:stCondLst>
+                              <p:cond delay="0"/>
+                            </p:stCondLst>
+                            <p:childTnLst>
+                              <p:par>
+                                <p:cTn id="5" presetID="10" presetClass="entr" presetSubtype="0" fill="hold" grpId="0" nodeType="clickEffect">
+                                  <p:stCondLst>
+                                    <p:cond delay="0"/>
+                                  </p:stCondLst>
+                                  <p:childTnLst>
+                                    <p:set>
+                                      <p:cBhvr>
+                                        <p:cTn id="6" dur="1" fill="hold">
+                                          <p:stCondLst>
+                                            <p:cond delay="0"/>
+                                          </p:stCondLst>
+                                        </p:cTn>
+                                        <p:tgtEl>
+                                          <p:spTgt spid="57"/>
+                                        </p:tgtEl>
+                                        <p:attrNameLst>
+                                          <p:attrName>style.visibility</p:attrName>
+                                        </p:attrNameLst>
+                                      </p:cBhvr>
+                                      <p:to>
+                                        <p:strVal val="visible"/>
+                                      </p:to>
+                                    </p:set>
+                                    <p:animEffect transition="in" filter="fade">
+                                      <p:cBhvr>
+                                        <p:cTn id="7" dur="500"/>
+                                        <p:tgtEl>
+                                          <p:spTgt spid="57"/>
+                                        </p:tgtEl>
+                                      </p:cBhvr>
+                                    </p:animEffect>
+                                  </p:childTnLst>
+                                </p:cTn>
+                              </p:par>
+                              <p:par>
+                                <p:cTn id="8" presetID="10" presetClass="entr" presetSubtype="0" fill="hold" grpId="0" nodeType="withEffect">
+                                  <p:stCondLst>
+                                    <p:cond delay="0"/>
+                                  </p:stCondLst>
+                                  <p:childTnLst>
+                                    <p:set>
+                                      <p:cBhvr>
+                                        <p:cTn id="9" dur="1" fill="hold">
+                                          <p:stCondLst>
+                                            <p:cond delay="0"/>
+                                          </p:stCondLst>
+                                        </p:cTn>
+                                        <p:tgtEl>
+                                          <p:spTgt spid="59"/>
+                                        </p:tgtEl>
+                                        <p:attrNameLst>
+                                          <p:attrName>style.visibility</p:attrName>
+                                        </p:attrNameLst>
+                                      </p:cBhvr>
+                                      <p:to>
+                                        <p:strVal val="visible"/>
+                                      </p:to>
+                                    </p:set>
+                                    <p:animEffect transition="in" filter="fade">
+                                      <p:cBhvr>
+                                        <p:cTn id="10" dur="500"/>
+                                        <p:tgtEl>
+                                          <p:spTgt spid="59"/>
+                                        </p:tgtEl>
+                                      </p:cBhvr>
+                                    </p:animEffect>
+                                  </p:childTnLst>
+                                </p:cTn>
+                              </p:par>
+                            </p:childTnLst>
+                          </p:cTn>
+                        </p:par>
+                      </p:childTnLst>
+                    </p:cTn>
+                  </p:par>
+                  <p:par>
+                    <p:cTn id="11" fill="hold">
+                      <p:stCondLst>
+                        <p:cond delay="indefinite"/>
+                      </p:stCondLst>
+                      <p:childTnLst>
+                        <p:par>
+                          <p:cTn id="12" fill="hold">
+                            <p:stCondLst>
+                              <p:cond delay="0"/>
+                            </p:stCondLst>
+                            <p:childTnLst>
+                              <p:par>
+                                <p:cTn id="13" presetID="10" presetClass="entr" presetSubtype="0" fill="hold" nodeType="clickEffect">
+                                  <p:stCondLst>
+                                    <p:cond delay="0"/>
+                                  </p:stCondLst>
+                                  <p:childTnLst>
+                                    <p:set>
+                                      <p:cBhvr>
+                                        <p:cTn id="14" dur="1" fill="hold">
+                                          <p:stCondLst>
+                                            <p:cond delay="0"/>
+                                          </p:stCondLst>
+                                        </p:cTn>
+                                        <p:tgtEl>
+                                          <p:spTgt spid="41"/>
+                                        </p:tgtEl>
+                                        <p:attrNameLst>
+                                          <p:attrName>style.visibility</p:attrName>
+                                        </p:attrNameLst>
+                                      </p:cBhvr>
+                                      <p:to>
+                                        <p:strVal val="visible"/>
+                                      </p:to>
+                                    </p:set>
+                                    <p:animEffect transition="in" filter="fade">
+                                      <p:cBhvr>
+                                        <p:cTn id="15" dur="500"/>
+                                        <p:tgtEl>
+                                          <p:spTgt spid="41"/>
+                                        </p:tgtEl>
+                                      </p:cBhvr>
+                                    </p:animEffect>
+                                  </p:childTnLst>
+                                </p:cTn>
+                              </p:par>
+                              <p:par>
+                                <p:cTn id="16" presetID="10" presetClass="entr" presetSubtype="0" fill="hold" nodeType="withEffect">
+                                  <p:stCondLst>
+                                    <p:cond delay="0"/>
+                                  </p:stCondLst>
+                                  <p:childTnLst>
+                                    <p:set>
+                                      <p:cBhvr>
+                                        <p:cTn id="17" dur="1" fill="hold">
+                                          <p:stCondLst>
+                                            <p:cond delay="0"/>
+                                          </p:stCondLst>
+                                        </p:cTn>
+                                        <p:tgtEl>
+                                          <p:spTgt spid="58"/>
+                                        </p:tgtEl>
+                                        <p:attrNameLst>
+                                          <p:attrName>style.visibility</p:attrName>
+                                        </p:attrNameLst>
+                                      </p:cBhvr>
+                                      <p:to>
+                                        <p:strVal val="visible"/>
+                                      </p:to>
+                                    </p:set>
+                                    <p:animEffect transition="in" filter="fade">
+                                      <p:cBhvr>
+                                        <p:cTn id="18" dur="500"/>
+                                        <p:tgtEl>
+                                          <p:spTgt spid="58"/>
+                                        </p:tgtEl>
+                                      </p:cBhvr>
+                                    </p:animEffect>
+                                  </p:childTnLst>
+                                </p:cTn>
+                              </p:par>
+                            </p:childTnLst>
+                          </p:cTn>
+                        </p:par>
+                      </p:childTnLst>
+                    </p:cTn>
+                  </p:par>
+                  <p:par>
+                    <p:cTn id="19" fill="hold">
+                      <p:stCondLst>
+                        <p:cond delay="indefinite"/>
+                      </p:stCondLst>
+                      <p:childTnLst>
+                        <p:par>
+                          <p:cTn id="20" fill="hold">
+                            <p:stCondLst>
+                              <p:cond delay="0"/>
+                            </p:stCondLst>
+                            <p:childTnLst>
+                              <p:par>
+                                <p:cTn id="21" presetID="42" presetClass="entr" presetSubtype="0" fill="hold" grpId="0" nodeType="clickEffect">
+                                  <p:stCondLst>
+                                    <p:cond delay="0"/>
+                                  </p:stCondLst>
+                                  <p:childTnLst>
+                                    <p:set>
+                                      <p:cBhvr>
+                                        <p:cTn id="22" dur="1" fill="hold">
+                                          <p:stCondLst>
+                                            <p:cond delay="0"/>
+                                          </p:stCondLst>
+                                        </p:cTn>
+                                        <p:tgtEl>
+                                          <p:spTgt spid="47"/>
+                                        </p:tgtEl>
+                                        <p:attrNameLst>
+                                          <p:attrName>style.visibility</p:attrName>
+                                        </p:attrNameLst>
+                                      </p:cBhvr>
+                                      <p:to>
+                                        <p:strVal val="visible"/>
+                                      </p:to>
+                                    </p:set>
+                                    <p:animEffect transition="in" filter="fade">
+                                      <p:cBhvr>
+                                        <p:cTn id="23" dur="1000"/>
+                                        <p:tgtEl>
+                                          <p:spTgt spid="47"/>
+                                        </p:tgtEl>
+                                      </p:cBhvr>
+                                    </p:animEffect>
+                                    <p:anim calcmode="lin" valueType="num">
+                                      <p:cBhvr>
+                                        <p:cTn id="24" dur="1000" fill="hold"/>
+                                        <p:tgtEl>
+                                          <p:spTgt spid="47"/>
+                                        </p:tgtEl>
+                                        <p:attrNameLst>
+                                          <p:attrName>ppt_x</p:attrName>
+                                        </p:attrNameLst>
+                                      </p:cBhvr>
+                                      <p:tavLst>
+                                        <p:tav tm="0">
+                                          <p:val>
+                                            <p:strVal val="#ppt_x"/>
+                                          </p:val>
+                                        </p:tav>
+                                        <p:tav tm="100000">
+                                          <p:val>
+                                            <p:strVal val="#ppt_x"/>
+                                          </p:val>
+                                        </p:tav>
+                                      </p:tavLst>
+                                    </p:anim>
+                                    <p:anim calcmode="lin" valueType="num">
+                                      <p:cBhvr>
+                                        <p:cTn id="25" dur="1000" fill="hold"/>
+                                        <p:tgtEl>
+                                          <p:spTgt spid="47"/>
+                                        </p:tgtEl>
+                                        <p:attrNameLst>
+                                          <p:attrName>ppt_y</p:attrName>
+                                        </p:attrNameLst>
+                                      </p:cBhvr>
+                                      <p:tavLst>
+                                        <p:tav tm="0">
+                                          <p:val>
+                                            <p:strVal val="#ppt_y+.1"/>
+                                          </p:val>
+                                        </p:tav>
+                                        <p:tav tm="100000">
+                                          <p:val>
+                                            <p:strVal val="#ppt_y"/>
+                                          </p:val>
+                                        </p:tav>
+                                      </p:tavLst>
+                                    </p:anim>
+                                  </p:childTnLst>
+                                </p:cTn>
+                              </p:par>
+                              <p:par>
+                                <p:cTn id="26" presetID="42" presetClass="entr" presetSubtype="0" fill="hold" grpId="0" nodeType="withEffect">
+                                  <p:stCondLst>
+                                    <p:cond delay="0"/>
+                                  </p:stCondLst>
+                                  <p:childTnLst>
+                                    <p:set>
+                                      <p:cBhvr>
+                                        <p:cTn id="27" dur="1" fill="hold">
+                                          <p:stCondLst>
+                                            <p:cond delay="0"/>
+                                          </p:stCondLst>
+                                        </p:cTn>
+                                        <p:tgtEl>
+                                          <p:spTgt spid="48"/>
+                                        </p:tgtEl>
+                                        <p:attrNameLst>
+                                          <p:attrName>style.visibility</p:attrName>
+                                        </p:attrNameLst>
+                                      </p:cBhvr>
+                                      <p:to>
+                                        <p:strVal val="visible"/>
+                                      </p:to>
+                                    </p:set>
+                                    <p:animEffect transition="in" filter="fade">
+                                      <p:cBhvr>
+                                        <p:cTn id="28" dur="1000"/>
+                                        <p:tgtEl>
+                                          <p:spTgt spid="48"/>
+                                        </p:tgtEl>
+                                      </p:cBhvr>
+                                    </p:animEffect>
+                                    <p:anim calcmode="lin" valueType="num">
+                                      <p:cBhvr>
+                                        <p:cTn id="29" dur="1000" fill="hold"/>
+                                        <p:tgtEl>
+                                          <p:spTgt spid="48"/>
+                                        </p:tgtEl>
+                                        <p:attrNameLst>
+                                          <p:attrName>ppt_x</p:attrName>
+                                        </p:attrNameLst>
+                                      </p:cBhvr>
+                                      <p:tavLst>
+                                        <p:tav tm="0">
+                                          <p:val>
+                                            <p:strVal val="#ppt_x"/>
+                                          </p:val>
+                                        </p:tav>
+                                        <p:tav tm="100000">
+                                          <p:val>
+                                            <p:strVal val="#ppt_x"/>
+                                          </p:val>
+                                        </p:tav>
+                                      </p:tavLst>
+                                    </p:anim>
+                                    <p:anim calcmode="lin" valueType="num">
+                                      <p:cBhvr>
+                                        <p:cTn id="30" dur="1000" fill="hold"/>
+                                        <p:tgtEl>
+                                          <p:spTgt spid="48"/>
+                                        </p:tgtEl>
+                                        <p:attrNameLst>
+                                          <p:attrName>ppt_y</p:attrName>
+                                        </p:attrNameLst>
+                                      </p:cBhvr>
+                                      <p:tavLst>
+                                        <p:tav tm="0">
+                                          <p:val>
+                                            <p:strVal val="#ppt_y+.1"/>
+                                          </p:val>
+                                        </p:tav>
+                                        <p:tav tm="100000">
+                                          <p:val>
+                                            <p:strVal val="#ppt_y"/>
+                                          </p:val>
+                                        </p:tav>
+                                      </p:tavLst>
+                                    </p:anim>
+                                  </p:childTnLst>
+                                </p:cTn>
+                              </p:par>
+                              <p:par>
+                                <p:cTn id="31" presetID="42" presetClass="entr" presetSubtype="0" fill="hold" grpId="0" nodeType="withEffect">
+                                  <p:stCondLst>
+                                    <p:cond delay="0"/>
+                                  </p:stCondLst>
+                                  <p:childTnLst>
+                                    <p:set>
+                                      <p:cBhvr>
+                                        <p:cTn id="32" dur="1" fill="hold">
+                                          <p:stCondLst>
+                                            <p:cond delay="0"/>
+                                          </p:stCondLst>
+                                        </p:cTn>
+                                        <p:tgtEl>
+                                          <p:spTgt spid="42"/>
+                                        </p:tgtEl>
+                                        <p:attrNameLst>
+                                          <p:attrName>style.visibility</p:attrName>
+                                        </p:attrNameLst>
+                                      </p:cBhvr>
+                                      <p:to>
+                                        <p:strVal val="visible"/>
+                                      </p:to>
+                                    </p:set>
+                                    <p:animEffect transition="in" filter="fade">
+                                      <p:cBhvr>
+                                        <p:cTn id="33" dur="1000"/>
+                                        <p:tgtEl>
+                                          <p:spTgt spid="42"/>
+                                        </p:tgtEl>
+                                      </p:cBhvr>
+                                    </p:animEffect>
+                                    <p:anim calcmode="lin" valueType="num">
+                                      <p:cBhvr>
+                                        <p:cTn id="34" dur="1000" fill="hold"/>
+                                        <p:tgtEl>
+                                          <p:spTgt spid="42"/>
+                                        </p:tgtEl>
+                                        <p:attrNameLst>
+                                          <p:attrName>ppt_x</p:attrName>
+                                        </p:attrNameLst>
+                                      </p:cBhvr>
+                                      <p:tavLst>
+                                        <p:tav tm="0">
+                                          <p:val>
+                                            <p:strVal val="#ppt_x"/>
+                                          </p:val>
+                                        </p:tav>
+                                        <p:tav tm="100000">
+                                          <p:val>
+                                            <p:strVal val="#ppt_x"/>
+                                          </p:val>
+                                        </p:tav>
+                                      </p:tavLst>
+                                    </p:anim>
+                                    <p:anim calcmode="lin" valueType="num">
+                                      <p:cBhvr>
+                                        <p:cTn id="35" dur="1000" fill="hold"/>
+                                        <p:tgtEl>
+                                          <p:spTgt spid="42"/>
+                                        </p:tgtEl>
+                                        <p:attrNameLst>
+                                          <p:attrName>ppt_y</p:attrName>
+                                        </p:attrNameLst>
+                                      </p:cBhvr>
+                                      <p:tavLst>
+                                        <p:tav tm="0">
+                                          <p:val>
+                                            <p:strVal val="#ppt_y+.1"/>
+                                          </p:val>
+                                        </p:tav>
+                                        <p:tav tm="100000">
+                                          <p:val>
+                                            <p:strVal val="#ppt_y"/>
+                                          </p:val>
+                                        </p:tav>
+                                      </p:tavLst>
+                                    </p:anim>
+                                  </p:childTnLst>
+                                </p:cTn>
+                              </p:par>
+                            </p:childTnLst>
+                          </p:cTn>
+                        </p:par>
+                      </p:childTnLst>
+                    </p:cTn>
+                  </p:par>
+                  <p:par>
+                    <p:cTn id="36" fill="hold">
+                      <p:stCondLst>
+                        <p:cond delay="indefinite"/>
+                      </p:stCondLst>
+                      <p:childTnLst>
+                        <p:par>
+                          <p:cTn id="37" fill="hold">
+                            <p:stCondLst>
+                              <p:cond delay="0"/>
+                            </p:stCondLst>
+                            <p:childTnLst>
+                              <p:par>
+                                <p:cTn id="38" presetID="42" presetClass="entr" presetSubtype="0" fill="hold" grpId="0" nodeType="clickEffect">
+                                  <p:stCondLst>
+                                    <p:cond delay="0"/>
+                                  </p:stCondLst>
+                                  <p:childTnLst>
+                                    <p:set>
+                                      <p:cBhvr>
+                                        <p:cTn id="39" dur="1" fill="hold">
+                                          <p:stCondLst>
+                                            <p:cond delay="0"/>
+                                          </p:stCondLst>
+                                        </p:cTn>
+                                        <p:tgtEl>
+                                          <p:spTgt spid="53"/>
+                                        </p:tgtEl>
+                                        <p:attrNameLst>
+                                          <p:attrName>style.visibility</p:attrName>
+                                        </p:attrNameLst>
+                                      </p:cBhvr>
+                                      <p:to>
+                                        <p:strVal val="visible"/>
+                                      </p:to>
+                                    </p:set>
+                                    <p:animEffect transition="in" filter="fade">
+                                      <p:cBhvr>
+                                        <p:cTn id="40" dur="1000"/>
+                                        <p:tgtEl>
+                                          <p:spTgt spid="53"/>
+                                        </p:tgtEl>
+                                      </p:cBhvr>
+                                    </p:animEffect>
+                                    <p:anim calcmode="lin" valueType="num">
+                                      <p:cBhvr>
+                                        <p:cTn id="41" dur="1000" fill="hold"/>
+                                        <p:tgtEl>
+                                          <p:spTgt spid="53"/>
+                                        </p:tgtEl>
+                                        <p:attrNameLst>
+                                          <p:attrName>ppt_x</p:attrName>
+                                        </p:attrNameLst>
+                                      </p:cBhvr>
+                                      <p:tavLst>
+                                        <p:tav tm="0">
+                                          <p:val>
+                                            <p:strVal val="#ppt_x"/>
+                                          </p:val>
+                                        </p:tav>
+                                        <p:tav tm="100000">
+                                          <p:val>
+                                            <p:strVal val="#ppt_x"/>
+                                          </p:val>
+                                        </p:tav>
+                                      </p:tavLst>
+                                    </p:anim>
+                                    <p:anim calcmode="lin" valueType="num">
+                                      <p:cBhvr>
+                                        <p:cTn id="42" dur="1000" fill="hold"/>
+                                        <p:tgtEl>
+                                          <p:spTgt spid="53"/>
+                                        </p:tgtEl>
+                                        <p:attrNameLst>
+                                          <p:attrName>ppt_y</p:attrName>
+                                        </p:attrNameLst>
+                                      </p:cBhvr>
+                                      <p:tavLst>
+                                        <p:tav tm="0">
+                                          <p:val>
+                                            <p:strVal val="#ppt_y+.1"/>
+                                          </p:val>
+                                        </p:tav>
+                                        <p:tav tm="100000">
+                                          <p:val>
+                                            <p:strVal val="#ppt_y"/>
+                                          </p:val>
+                                        </p:tav>
+                                      </p:tavLst>
+                                    </p:anim>
+                                  </p:childTnLst>
+                                </p:cTn>
+                              </p:par>
+                              <p:par>
+                                <p:cTn id="43" presetID="42" presetClass="entr" presetSubtype="0" fill="hold" grpId="0" nodeType="withEffect">
+                                  <p:stCondLst>
+                                    <p:cond delay="0"/>
+                                  </p:stCondLst>
+                                  <p:childTnLst>
+                                    <p:set>
+                                      <p:cBhvr>
+                                        <p:cTn id="44" dur="1" fill="hold">
+                                          <p:stCondLst>
+                                            <p:cond delay="0"/>
+                                          </p:stCondLst>
+                                        </p:cTn>
+                                        <p:tgtEl>
+                                          <p:spTgt spid="54"/>
+                                        </p:tgtEl>
+                                        <p:attrNameLst>
+                                          <p:attrName>style.visibility</p:attrName>
+                                        </p:attrNameLst>
+                                      </p:cBhvr>
+                                      <p:to>
+                                        <p:strVal val="visible"/>
+                                      </p:to>
+                                    </p:set>
+                                    <p:animEffect transition="in" filter="fade">
+                                      <p:cBhvr>
+                                        <p:cTn id="45" dur="1000"/>
+                                        <p:tgtEl>
+                                          <p:spTgt spid="54"/>
+                                        </p:tgtEl>
+                                      </p:cBhvr>
+                                    </p:animEffect>
+                                    <p:anim calcmode="lin" valueType="num">
+                                      <p:cBhvr>
+                                        <p:cTn id="46" dur="1000" fill="hold"/>
+                                        <p:tgtEl>
+                                          <p:spTgt spid="54"/>
+                                        </p:tgtEl>
+                                        <p:attrNameLst>
+                                          <p:attrName>ppt_x</p:attrName>
+                                        </p:attrNameLst>
+                                      </p:cBhvr>
+                                      <p:tavLst>
+                                        <p:tav tm="0">
+                                          <p:val>
+                                            <p:strVal val="#ppt_x"/>
+                                          </p:val>
+                                        </p:tav>
+                                        <p:tav tm="100000">
+                                          <p:val>
+                                            <p:strVal val="#ppt_x"/>
+                                          </p:val>
+                                        </p:tav>
+                                      </p:tavLst>
+                                    </p:anim>
+                                    <p:anim calcmode="lin" valueType="num">
+                                      <p:cBhvr>
+                                        <p:cTn id="47" dur="1000" fill="hold"/>
+                                        <p:tgtEl>
+                                          <p:spTgt spid="54"/>
+                                        </p:tgtEl>
+                                        <p:attrNameLst>
+                                          <p:attrName>ppt_y</p:attrName>
+                                        </p:attrNameLst>
+                                      </p:cBhvr>
+                                      <p:tavLst>
+                                        <p:tav tm="0">
+                                          <p:val>
+                                            <p:strVal val="#ppt_y+.1"/>
+                                          </p:val>
+                                        </p:tav>
+                                        <p:tav tm="100000">
+                                          <p:val>
+                                            <p:strVal val="#ppt_y"/>
+                                          </p:val>
+                                        </p:tav>
+                                      </p:tavLst>
+                                    </p:anim>
+                                  </p:childTnLst>
+                                </p:cTn>
+                              </p:par>
+                              <p:par>
+                                <p:cTn id="48" presetID="42" presetClass="entr" presetSubtype="0" fill="hold" grpId="0" nodeType="withEffect">
+                                  <p:stCondLst>
+                                    <p:cond delay="0"/>
+                                  </p:stCondLst>
+                                  <p:childTnLst>
+                                    <p:set>
+                                      <p:cBhvr>
+                                        <p:cTn id="49" dur="1" fill="hold">
+                                          <p:stCondLst>
+                                            <p:cond delay="0"/>
+                                          </p:stCondLst>
+                                        </p:cTn>
+                                        <p:tgtEl>
+                                          <p:spTgt spid="43"/>
+                                        </p:tgtEl>
+                                        <p:attrNameLst>
+                                          <p:attrName>style.visibility</p:attrName>
+                                        </p:attrNameLst>
+                                      </p:cBhvr>
+                                      <p:to>
+                                        <p:strVal val="visible"/>
+                                      </p:to>
+                                    </p:set>
+                                    <p:animEffect transition="in" filter="fade">
+                                      <p:cBhvr>
+                                        <p:cTn id="50" dur="1000"/>
+                                        <p:tgtEl>
+                                          <p:spTgt spid="43"/>
+                                        </p:tgtEl>
+                                      </p:cBhvr>
+                                    </p:animEffect>
+                                    <p:anim calcmode="lin" valueType="num">
+                                      <p:cBhvr>
+                                        <p:cTn id="51" dur="1000" fill="hold"/>
+                                        <p:tgtEl>
+                                          <p:spTgt spid="43"/>
+                                        </p:tgtEl>
+                                        <p:attrNameLst>
+                                          <p:attrName>ppt_x</p:attrName>
+                                        </p:attrNameLst>
+                                      </p:cBhvr>
+                                      <p:tavLst>
+                                        <p:tav tm="0">
+                                          <p:val>
+                                            <p:strVal val="#ppt_x"/>
+                                          </p:val>
+                                        </p:tav>
+                                        <p:tav tm="100000">
+                                          <p:val>
+                                            <p:strVal val="#ppt_x"/>
+                                          </p:val>
+                                        </p:tav>
+                                      </p:tavLst>
+                                    </p:anim>
+                                    <p:anim calcmode="lin" valueType="num">
+                                      <p:cBhvr>
+                                        <p:cTn id="52" dur="1000" fill="hold"/>
+                                        <p:tgtEl>
+                                          <p:spTgt spid="43"/>
+                                        </p:tgtEl>
+                                        <p:attrNameLst>
+                                          <p:attrName>ppt_y</p:attrName>
+                                        </p:attrNameLst>
+                                      </p:cBhvr>
+                                      <p:tavLst>
+                                        <p:tav tm="0">
+                                          <p:val>
+                                            <p:strVal val="#ppt_y+.1"/>
+                                          </p:val>
+                                        </p:tav>
+                                        <p:tav tm="100000">
+                                          <p:val>
+                                            <p:strVal val="#ppt_y"/>
+                                          </p:val>
+                                        </p:tav>
+                                      </p:tavLst>
+                                    </p:anim>
+                                  </p:childTnLst>
+                                </p:cTn>
+                              </p:par>
+                            </p:childTnLst>
+                          </p:cTn>
+                        </p:par>
+                      </p:childTnLst>
+                    </p:cTn>
+                  </p:par>
+                  <p:par>
+                    <p:cTn id="53" fill="hold">
+                      <p:stCondLst>
+                        <p:cond delay="indefinite"/>
+                      </p:stCondLst>
+                      <p:childTnLst>
+                        <p:par>
+                          <p:cTn id="54" fill="hold">
+                            <p:stCondLst>
+                              <p:cond delay="0"/>
+                            </p:stCondLst>
+                            <p:childTnLst>
+                              <p:par>
+                                <p:cTn id="55" presetID="42" presetClass="entr" presetSubtype="0" fill="hold" grpId="0" nodeType="clickEffect">
+                                  <p:stCondLst>
+                                    <p:cond delay="0"/>
+                                  </p:stCondLst>
+                                  <p:childTnLst>
+                                    <p:set>
+                                      <p:cBhvr>
+                                        <p:cTn id="56" dur="1" fill="hold">
+                                          <p:stCondLst>
+                                            <p:cond delay="0"/>
+                                          </p:stCondLst>
+                                        </p:cTn>
+                                        <p:tgtEl>
+                                          <p:spTgt spid="49"/>
+                                        </p:tgtEl>
+                                        <p:attrNameLst>
+                                          <p:attrName>style.visibility</p:attrName>
+                                        </p:attrNameLst>
+                                      </p:cBhvr>
+                                      <p:to>
+                                        <p:strVal val="visible"/>
+                                      </p:to>
+                                    </p:set>
+                                    <p:animEffect transition="in" filter="fade">
+                                      <p:cBhvr>
+                                        <p:cTn id="57" dur="1000"/>
+                                        <p:tgtEl>
+                                          <p:spTgt spid="49"/>
+                                        </p:tgtEl>
+                                      </p:cBhvr>
+                                    </p:animEffect>
+                                    <p:anim calcmode="lin" valueType="num">
+                                      <p:cBhvr>
+                                        <p:cTn id="58" dur="1000" fill="hold"/>
+                                        <p:tgtEl>
+                                          <p:spTgt spid="49"/>
+                                        </p:tgtEl>
+                                        <p:attrNameLst>
+                                          <p:attrName>ppt_x</p:attrName>
+                                        </p:attrNameLst>
+                                      </p:cBhvr>
+                                      <p:tavLst>
+                                        <p:tav tm="0">
+                                          <p:val>
+                                            <p:strVal val="#ppt_x"/>
+                                          </p:val>
+                                        </p:tav>
+                                        <p:tav tm="100000">
+                                          <p:val>
+                                            <p:strVal val="#ppt_x"/>
+                                          </p:val>
+                                        </p:tav>
+                                      </p:tavLst>
+                                    </p:anim>
+                                    <p:anim calcmode="lin" valueType="num">
+                                      <p:cBhvr>
+                                        <p:cTn id="59" dur="1000" fill="hold"/>
+                                        <p:tgtEl>
+                                          <p:spTgt spid="49"/>
+                                        </p:tgtEl>
+                                        <p:attrNameLst>
+                                          <p:attrName>ppt_y</p:attrName>
+                                        </p:attrNameLst>
+                                      </p:cBhvr>
+                                      <p:tavLst>
+                                        <p:tav tm="0">
+                                          <p:val>
+                                            <p:strVal val="#ppt_y+.1"/>
+                                          </p:val>
+                                        </p:tav>
+                                        <p:tav tm="100000">
+                                          <p:val>
+                                            <p:strVal val="#ppt_y"/>
+                                          </p:val>
+                                        </p:tav>
+                                      </p:tavLst>
+                                    </p:anim>
+                                  </p:childTnLst>
+                                </p:cTn>
+                              </p:par>
+                              <p:par>
+                                <p:cTn id="60" presetID="42" presetClass="entr" presetSubtype="0" fill="hold" grpId="0" nodeType="withEffect">
+                                  <p:stCondLst>
+                                    <p:cond delay="0"/>
+                                  </p:stCondLst>
+                                  <p:childTnLst>
+                                    <p:set>
+                                      <p:cBhvr>
+                                        <p:cTn id="61" dur="1" fill="hold">
+                                          <p:stCondLst>
+                                            <p:cond delay="0"/>
+                                          </p:stCondLst>
+                                        </p:cTn>
+                                        <p:tgtEl>
+                                          <p:spTgt spid="50"/>
+                                        </p:tgtEl>
+                                        <p:attrNameLst>
+                                          <p:attrName>style.visibility</p:attrName>
+                                        </p:attrNameLst>
+                                      </p:cBhvr>
+                                      <p:to>
+                                        <p:strVal val="visible"/>
+                                      </p:to>
+                                    </p:set>
+                                    <p:animEffect transition="in" filter="fade">
+                                      <p:cBhvr>
+                                        <p:cTn id="62" dur="1000"/>
+                                        <p:tgtEl>
+                                          <p:spTgt spid="50"/>
+                                        </p:tgtEl>
+                                      </p:cBhvr>
+                                    </p:animEffect>
+                                    <p:anim calcmode="lin" valueType="num">
+                                      <p:cBhvr>
+                                        <p:cTn id="63" dur="1000" fill="hold"/>
+                                        <p:tgtEl>
+                                          <p:spTgt spid="50"/>
+                                        </p:tgtEl>
+                                        <p:attrNameLst>
+                                          <p:attrName>ppt_x</p:attrName>
+                                        </p:attrNameLst>
+                                      </p:cBhvr>
+                                      <p:tavLst>
+                                        <p:tav tm="0">
+                                          <p:val>
+                                            <p:strVal val="#ppt_x"/>
+                                          </p:val>
+                                        </p:tav>
+                                        <p:tav tm="100000">
+                                          <p:val>
+                                            <p:strVal val="#ppt_x"/>
+                                          </p:val>
+                                        </p:tav>
+                                      </p:tavLst>
+                                    </p:anim>
+                                    <p:anim calcmode="lin" valueType="num">
+                                      <p:cBhvr>
+                                        <p:cTn id="64" dur="1000" fill="hold"/>
+                                        <p:tgtEl>
+                                          <p:spTgt spid="50"/>
+                                        </p:tgtEl>
+                                        <p:attrNameLst>
+                                          <p:attrName>ppt_y</p:attrName>
+                                        </p:attrNameLst>
+                                      </p:cBhvr>
+                                      <p:tavLst>
+                                        <p:tav tm="0">
+                                          <p:val>
+                                            <p:strVal val="#ppt_y+.1"/>
+                                          </p:val>
+                                        </p:tav>
+                                        <p:tav tm="100000">
+                                          <p:val>
+                                            <p:strVal val="#ppt_y"/>
+                                          </p:val>
+                                        </p:tav>
+                                      </p:tavLst>
+                                    </p:anim>
+                                  </p:childTnLst>
+                                </p:cTn>
+                              </p:par>
+                              <p:par>
+                                <p:cTn id="65" presetID="42" presetClass="entr" presetSubtype="0" fill="hold" grpId="0" nodeType="withEffect">
+                                  <p:stCondLst>
+                                    <p:cond delay="0"/>
+                                  </p:stCondLst>
+                                  <p:childTnLst>
+                                    <p:set>
+                                      <p:cBhvr>
+                                        <p:cTn id="66" dur="1" fill="hold">
+                                          <p:stCondLst>
+                                            <p:cond delay="0"/>
+                                          </p:stCondLst>
+                                        </p:cTn>
+                                        <p:tgtEl>
+                                          <p:spTgt spid="44"/>
+                                        </p:tgtEl>
+                                        <p:attrNameLst>
+                                          <p:attrName>style.visibility</p:attrName>
+                                        </p:attrNameLst>
+                                      </p:cBhvr>
+                                      <p:to>
+                                        <p:strVal val="visible"/>
+                                      </p:to>
+                                    </p:set>
+                                    <p:animEffect transition="in" filter="fade">
+                                      <p:cBhvr>
+                                        <p:cTn id="67" dur="1000"/>
+                                        <p:tgtEl>
+                                          <p:spTgt spid="44"/>
+                                        </p:tgtEl>
+                                      </p:cBhvr>
+                                    </p:animEffect>
+                                    <p:anim calcmode="lin" valueType="num">
+                                      <p:cBhvr>
+                                        <p:cTn id="68" dur="1000" fill="hold"/>
+                                        <p:tgtEl>
+                                          <p:spTgt spid="44"/>
+                                        </p:tgtEl>
+                                        <p:attrNameLst>
+                                          <p:attrName>ppt_x</p:attrName>
+                                        </p:attrNameLst>
+                                      </p:cBhvr>
+                                      <p:tavLst>
+                                        <p:tav tm="0">
+                                          <p:val>
+                                            <p:strVal val="#ppt_x"/>
+                                          </p:val>
+                                        </p:tav>
+                                        <p:tav tm="100000">
+                                          <p:val>
+                                            <p:strVal val="#ppt_x"/>
+                                          </p:val>
+                                        </p:tav>
+                                      </p:tavLst>
+                                    </p:anim>
+                                    <p:anim calcmode="lin" valueType="num">
+                                      <p:cBhvr>
+                                        <p:cTn id="69" dur="1000" fill="hold"/>
+                                        <p:tgtEl>
+                                          <p:spTgt spid="44"/>
+                                        </p:tgtEl>
+                                        <p:attrNameLst>
+                                          <p:attrName>ppt_y</p:attrName>
+                                        </p:attrNameLst>
+                                      </p:cBhvr>
+                                      <p:tavLst>
+                                        <p:tav tm="0">
+                                          <p:val>
+                                            <p:strVal val="#ppt_y+.1"/>
+                                          </p:val>
+                                        </p:tav>
+                                        <p:tav tm="100000">
+                                          <p:val>
+                                            <p:strVal val="#ppt_y"/>
+                                          </p:val>
+                                        </p:tav>
+                                      </p:tavLst>
+                                    </p:anim>
+                                  </p:childTnLst>
+                                </p:cTn>
+                              </p:par>
+                            </p:childTnLst>
+                          </p:cTn>
+                        </p:par>
+                      </p:childTnLst>
+                    </p:cTn>
+                  </p:par>
+                  <p:par>
+                    <p:cTn id="70" fill="hold">
+                      <p:stCondLst>
+                        <p:cond delay="indefinite"/>
+                      </p:stCondLst>
+                      <p:childTnLst>
+                        <p:par>
+                          <p:cTn id="71" fill="hold">
+                            <p:stCondLst>
+                              <p:cond delay="0"/>
+                            </p:stCondLst>
+                            <p:childTnLst>
+                              <p:par>
+                                <p:cTn id="72" presetID="42" presetClass="entr" presetSubtype="0" fill="hold" grpId="0" nodeType="clickEffect">
+                                  <p:stCondLst>
+                                    <p:cond delay="0"/>
+                                  </p:stCondLst>
+                                  <p:childTnLst>
+                                    <p:set>
+                                      <p:cBhvr>
+                                        <p:cTn id="73" dur="1" fill="hold">
+                                          <p:stCondLst>
+                                            <p:cond delay="0"/>
+                                          </p:stCondLst>
+                                        </p:cTn>
+                                        <p:tgtEl>
+                                          <p:spTgt spid="55"/>
+                                        </p:tgtEl>
+                                        <p:attrNameLst>
+                                          <p:attrName>style.visibility</p:attrName>
+                                        </p:attrNameLst>
+                                      </p:cBhvr>
+                                      <p:to>
+                                        <p:strVal val="visible"/>
+                                      </p:to>
+                                    </p:set>
+                                    <p:animEffect transition="in" filter="fade">
+                                      <p:cBhvr>
+                                        <p:cTn id="74" dur="1000"/>
+                                        <p:tgtEl>
+                                          <p:spTgt spid="55"/>
+                                        </p:tgtEl>
+                                      </p:cBhvr>
+                                    </p:animEffect>
+                                    <p:anim calcmode="lin" valueType="num">
+                                      <p:cBhvr>
+                                        <p:cTn id="75" dur="1000" fill="hold"/>
+                                        <p:tgtEl>
+                                          <p:spTgt spid="55"/>
+                                        </p:tgtEl>
+                                        <p:attrNameLst>
+                                          <p:attrName>ppt_x</p:attrName>
+                                        </p:attrNameLst>
+                                      </p:cBhvr>
+                                      <p:tavLst>
+                                        <p:tav tm="0">
+                                          <p:val>
+                                            <p:strVal val="#ppt_x"/>
+                                          </p:val>
+                                        </p:tav>
+                                        <p:tav tm="100000">
+                                          <p:val>
+                                            <p:strVal val="#ppt_x"/>
+                                          </p:val>
+                                        </p:tav>
+                                      </p:tavLst>
+                                    </p:anim>
+                                    <p:anim calcmode="lin" valueType="num">
+                                      <p:cBhvr>
+                                        <p:cTn id="76" dur="1000" fill="hold"/>
+                                        <p:tgtEl>
+                                          <p:spTgt spid="55"/>
+                                        </p:tgtEl>
+                                        <p:attrNameLst>
+                                          <p:attrName>ppt_y</p:attrName>
+                                        </p:attrNameLst>
+                                      </p:cBhvr>
+                                      <p:tavLst>
+                                        <p:tav tm="0">
+                                          <p:val>
+                                            <p:strVal val="#ppt_y+.1"/>
+                                          </p:val>
+                                        </p:tav>
+                                        <p:tav tm="100000">
+                                          <p:val>
+                                            <p:strVal val="#ppt_y"/>
+                                          </p:val>
+                                        </p:tav>
+                                      </p:tavLst>
+                                    </p:anim>
+                                  </p:childTnLst>
+                                </p:cTn>
+                              </p:par>
+                              <p:par>
+                                <p:cTn id="77" presetID="42" presetClass="entr" presetSubtype="0" fill="hold" grpId="0" nodeType="withEffect">
+                                  <p:stCondLst>
+                                    <p:cond delay="0"/>
+                                  </p:stCondLst>
+                                  <p:childTnLst>
+                                    <p:set>
+                                      <p:cBhvr>
+                                        <p:cTn id="78" dur="1" fill="hold">
+                                          <p:stCondLst>
+                                            <p:cond delay="0"/>
+                                          </p:stCondLst>
+                                        </p:cTn>
+                                        <p:tgtEl>
+                                          <p:spTgt spid="56"/>
+                                        </p:tgtEl>
+                                        <p:attrNameLst>
+                                          <p:attrName>style.visibility</p:attrName>
+                                        </p:attrNameLst>
+                                      </p:cBhvr>
+                                      <p:to>
+                                        <p:strVal val="visible"/>
+                                      </p:to>
+                                    </p:set>
+                                    <p:animEffect transition="in" filter="fade">
+                                      <p:cBhvr>
+                                        <p:cTn id="79" dur="1000"/>
+                                        <p:tgtEl>
+                                          <p:spTgt spid="56"/>
+                                        </p:tgtEl>
+                                      </p:cBhvr>
+                                    </p:animEffect>
+                                    <p:anim calcmode="lin" valueType="num">
+                                      <p:cBhvr>
+                                        <p:cTn id="80" dur="1000" fill="hold"/>
+                                        <p:tgtEl>
+                                          <p:spTgt spid="56"/>
+                                        </p:tgtEl>
+                                        <p:attrNameLst>
+                                          <p:attrName>ppt_x</p:attrName>
+                                        </p:attrNameLst>
+                                      </p:cBhvr>
+                                      <p:tavLst>
+                                        <p:tav tm="0">
+                                          <p:val>
+                                            <p:strVal val="#ppt_x"/>
+                                          </p:val>
+                                        </p:tav>
+                                        <p:tav tm="100000">
+                                          <p:val>
+                                            <p:strVal val="#ppt_x"/>
+                                          </p:val>
+                                        </p:tav>
+                                      </p:tavLst>
+                                    </p:anim>
+                                    <p:anim calcmode="lin" valueType="num">
+                                      <p:cBhvr>
+                                        <p:cTn id="81" dur="1000" fill="hold"/>
+                                        <p:tgtEl>
+                                          <p:spTgt spid="56"/>
+                                        </p:tgtEl>
+                                        <p:attrNameLst>
+                                          <p:attrName>ppt_y</p:attrName>
+                                        </p:attrNameLst>
+                                      </p:cBhvr>
+                                      <p:tavLst>
+                                        <p:tav tm="0">
+                                          <p:val>
+                                            <p:strVal val="#ppt_y+.1"/>
+                                          </p:val>
+                                        </p:tav>
+                                        <p:tav tm="100000">
+                                          <p:val>
+                                            <p:strVal val="#ppt_y"/>
+                                          </p:val>
+                                        </p:tav>
+                                      </p:tavLst>
+                                    </p:anim>
+                                  </p:childTnLst>
+                                </p:cTn>
+                              </p:par>
+                              <p:par>
+                                <p:cTn id="82" presetID="42" presetClass="entr" presetSubtype="0" fill="hold" grpId="0" nodeType="withEffect">
+                                  <p:stCondLst>
+                                    <p:cond delay="0"/>
+                                  </p:stCondLst>
+                                  <p:childTnLst>
+                                    <p:set>
+                                      <p:cBhvr>
+                                        <p:cTn id="83" dur="1" fill="hold">
+                                          <p:stCondLst>
+                                            <p:cond delay="0"/>
+                                          </p:stCondLst>
+                                        </p:cTn>
+                                        <p:tgtEl>
+                                          <p:spTgt spid="45"/>
+                                        </p:tgtEl>
+                                        <p:attrNameLst>
+                                          <p:attrName>style.visibility</p:attrName>
+                                        </p:attrNameLst>
+                                      </p:cBhvr>
+                                      <p:to>
+                                        <p:strVal val="visible"/>
+                                      </p:to>
+                                    </p:set>
+                                    <p:animEffect transition="in" filter="fade">
+                                      <p:cBhvr>
+                                        <p:cTn id="84" dur="1000"/>
+                                        <p:tgtEl>
+                                          <p:spTgt spid="45"/>
+                                        </p:tgtEl>
+                                      </p:cBhvr>
+                                    </p:animEffect>
+                                    <p:anim calcmode="lin" valueType="num">
+                                      <p:cBhvr>
+                                        <p:cTn id="85" dur="1000" fill="hold"/>
+                                        <p:tgtEl>
+                                          <p:spTgt spid="45"/>
+                                        </p:tgtEl>
+                                        <p:attrNameLst>
+                                          <p:attrName>ppt_x</p:attrName>
+                                        </p:attrNameLst>
+                                      </p:cBhvr>
+                                      <p:tavLst>
+                                        <p:tav tm="0">
+                                          <p:val>
+                                            <p:strVal val="#ppt_x"/>
+                                          </p:val>
+                                        </p:tav>
+                                        <p:tav tm="100000">
+                                          <p:val>
+                                            <p:strVal val="#ppt_x"/>
+                                          </p:val>
+                                        </p:tav>
+                                      </p:tavLst>
+                                    </p:anim>
+                                    <p:anim calcmode="lin" valueType="num">
+                                      <p:cBhvr>
+                                        <p:cTn id="86" dur="1000" fill="hold"/>
+                                        <p:tgtEl>
+                                          <p:spTgt spid="45"/>
+                                        </p:tgtEl>
+                                        <p:attrNameLst>
+                                          <p:attrName>ppt_y</p:attrName>
+                                        </p:attrNameLst>
+                                      </p:cBhvr>
+                                      <p:tavLst>
+                                        <p:tav tm="0">
+                                          <p:val>
+                                            <p:strVal val="#ppt_y+.1"/>
+                                          </p:val>
+                                        </p:tav>
+                                        <p:tav tm="100000">
+                                          <p:val>
+                                            <p:strVal val="#ppt_y"/>
+                                          </p:val>
+                                        </p:tav>
+                                      </p:tavLst>
+                                    </p:anim>
+                                  </p:childTnLst>
+                                </p:cTn>
+                              </p:par>
+                            </p:childTnLst>
+                          </p:cTn>
+                        </p:par>
+                      </p:childTnLst>
+                    </p:cTn>
+                  </p:par>
+                  <p:par>
+                    <p:cTn id="87" fill="hold">
+                      <p:stCondLst>
+                        <p:cond delay="indefinite"/>
+                      </p:stCondLst>
+                      <p:childTnLst>
+                        <p:par>
+                          <p:cTn id="88" fill="hold">
+                            <p:stCondLst>
+                              <p:cond delay="0"/>
+                            </p:stCondLst>
+                            <p:childTnLst>
+                              <p:par>
+                                <p:cTn id="89" presetID="42" presetClass="entr" presetSubtype="0" fill="hold" grpId="0" nodeType="clickEffect">
+                                  <p:stCondLst>
+                                    <p:cond delay="0"/>
+                                  </p:stCondLst>
+                                  <p:childTnLst>
+                                    <p:set>
+                                      <p:cBhvr>
+                                        <p:cTn id="90" dur="1" fill="hold">
+                                          <p:stCondLst>
+                                            <p:cond delay="0"/>
+                                          </p:stCondLst>
+                                        </p:cTn>
+                                        <p:tgtEl>
+                                          <p:spTgt spid="51"/>
+                                        </p:tgtEl>
+                                        <p:attrNameLst>
+                                          <p:attrName>style.visibility</p:attrName>
+                                        </p:attrNameLst>
+                                      </p:cBhvr>
+                                      <p:to>
+                                        <p:strVal val="visible"/>
+                                      </p:to>
+                                    </p:set>
+                                    <p:animEffect transition="in" filter="fade">
+                                      <p:cBhvr>
+                                        <p:cTn id="91" dur="1000"/>
+                                        <p:tgtEl>
+                                          <p:spTgt spid="51"/>
+                                        </p:tgtEl>
+                                      </p:cBhvr>
+                                    </p:animEffect>
+                                    <p:anim calcmode="lin" valueType="num">
+                                      <p:cBhvr>
+                                        <p:cTn id="92" dur="1000" fill="hold"/>
+                                        <p:tgtEl>
+                                          <p:spTgt spid="51"/>
+                                        </p:tgtEl>
+                                        <p:attrNameLst>
+                                          <p:attrName>ppt_x</p:attrName>
+                                        </p:attrNameLst>
+                                      </p:cBhvr>
+                                      <p:tavLst>
+                                        <p:tav tm="0">
+                                          <p:val>
+                                            <p:strVal val="#ppt_x"/>
+                                          </p:val>
+                                        </p:tav>
+                                        <p:tav tm="100000">
+                                          <p:val>
+                                            <p:strVal val="#ppt_x"/>
+                                          </p:val>
+                                        </p:tav>
+                                      </p:tavLst>
+                                    </p:anim>
+                                    <p:anim calcmode="lin" valueType="num">
+                                      <p:cBhvr>
+                                        <p:cTn id="93" dur="1000" fill="hold"/>
+                                        <p:tgtEl>
+                                          <p:spTgt spid="51"/>
+                                        </p:tgtEl>
+                                        <p:attrNameLst>
+                                          <p:attrName>ppt_y</p:attrName>
+                                        </p:attrNameLst>
+                                      </p:cBhvr>
+                                      <p:tavLst>
+                                        <p:tav tm="0">
+                                          <p:val>
+                                            <p:strVal val="#ppt_y+.1"/>
+                                          </p:val>
+                                        </p:tav>
+                                        <p:tav tm="100000">
+                                          <p:val>
+                                            <p:strVal val="#ppt_y"/>
+                                          </p:val>
+                                        </p:tav>
+                                      </p:tavLst>
+                                    </p:anim>
+                                  </p:childTnLst>
+                                </p:cTn>
+                              </p:par>
+                              <p:par>
+                                <p:cTn id="94" presetID="42" presetClass="entr" presetSubtype="0" fill="hold" grpId="0" nodeType="withEffect">
+                                  <p:stCondLst>
+                                    <p:cond delay="0"/>
+                                  </p:stCondLst>
+                                  <p:childTnLst>
+                                    <p:set>
+                                      <p:cBhvr>
+                                        <p:cTn id="95" dur="1" fill="hold">
+                                          <p:stCondLst>
+                                            <p:cond delay="0"/>
+                                          </p:stCondLst>
+                                        </p:cTn>
+                                        <p:tgtEl>
+                                          <p:spTgt spid="52"/>
+                                        </p:tgtEl>
+                                        <p:attrNameLst>
+                                          <p:attrName>style.visibility</p:attrName>
+                                        </p:attrNameLst>
+                                      </p:cBhvr>
+                                      <p:to>
+                                        <p:strVal val="visible"/>
+                                      </p:to>
+                                    </p:set>
+                                    <p:animEffect transition="in" filter="fade">
+                                      <p:cBhvr>
+                                        <p:cTn id="96" dur="1000"/>
+                                        <p:tgtEl>
+                                          <p:spTgt spid="52"/>
+                                        </p:tgtEl>
+                                      </p:cBhvr>
+                                    </p:animEffect>
+                                    <p:anim calcmode="lin" valueType="num">
+                                      <p:cBhvr>
+                                        <p:cTn id="97" dur="1000" fill="hold"/>
+                                        <p:tgtEl>
+                                          <p:spTgt spid="52"/>
+                                        </p:tgtEl>
+                                        <p:attrNameLst>
+                                          <p:attrName>ppt_x</p:attrName>
+                                        </p:attrNameLst>
+                                      </p:cBhvr>
+                                      <p:tavLst>
+                                        <p:tav tm="0">
+                                          <p:val>
+                                            <p:strVal val="#ppt_x"/>
+                                          </p:val>
+                                        </p:tav>
+                                        <p:tav tm="100000">
+                                          <p:val>
+                                            <p:strVal val="#ppt_x"/>
+                                          </p:val>
+                                        </p:tav>
+                                      </p:tavLst>
+                                    </p:anim>
+                                    <p:anim calcmode="lin" valueType="num">
+                                      <p:cBhvr>
+                                        <p:cTn id="98" dur="1000" fill="hold"/>
+                                        <p:tgtEl>
+                                          <p:spTgt spid="52"/>
+                                        </p:tgtEl>
+                                        <p:attrNameLst>
+                                          <p:attrName>ppt_y</p:attrName>
+                                        </p:attrNameLst>
+                                      </p:cBhvr>
+                                      <p:tavLst>
+                                        <p:tav tm="0">
+                                          <p:val>
+                                            <p:strVal val="#ppt_y+.1"/>
+                                          </p:val>
+                                        </p:tav>
+                                        <p:tav tm="100000">
+                                          <p:val>
+                                            <p:strVal val="#ppt_y"/>
+                                          </p:val>
+                                        </p:tav>
+                                      </p:tavLst>
+                                    </p:anim>
+                                  </p:childTnLst>
+                                </p:cTn>
+                              </p:par>
+                              <p:par>
+                                <p:cTn id="99" presetID="42" presetClass="entr" presetSubtype="0" fill="hold" grpId="0" nodeType="withEffect">
+                                  <p:stCondLst>
+                                    <p:cond delay="0"/>
+                                  </p:stCondLst>
+                                  <p:childTnLst>
+                                    <p:set>
+                                      <p:cBhvr>
+                                        <p:cTn id="100" dur="1" fill="hold">
+                                          <p:stCondLst>
+                                            <p:cond delay="0"/>
+                                          </p:stCondLst>
+                                        </p:cTn>
+                                        <p:tgtEl>
+                                          <p:spTgt spid="46"/>
+                                        </p:tgtEl>
+                                        <p:attrNameLst>
+                                          <p:attrName>style.visibility</p:attrName>
+                                        </p:attrNameLst>
+                                      </p:cBhvr>
+                                      <p:to>
+                                        <p:strVal val="visible"/>
+                                      </p:to>
+                                    </p:set>
+                                    <p:animEffect transition="in" filter="fade">
+                                      <p:cBhvr>
+                                        <p:cTn id="101" dur="1000"/>
+                                        <p:tgtEl>
+                                          <p:spTgt spid="46"/>
+                                        </p:tgtEl>
+                                      </p:cBhvr>
+                                    </p:animEffect>
+                                    <p:anim calcmode="lin" valueType="num">
+                                      <p:cBhvr>
+                                        <p:cTn id="102" dur="1000" fill="hold"/>
+                                        <p:tgtEl>
+                                          <p:spTgt spid="46"/>
+                                        </p:tgtEl>
+                                        <p:attrNameLst>
+                                          <p:attrName>ppt_x</p:attrName>
+                                        </p:attrNameLst>
+                                      </p:cBhvr>
+                                      <p:tavLst>
+                                        <p:tav tm="0">
+                                          <p:val>
+                                            <p:strVal val="#ppt_x"/>
+                                          </p:val>
+                                        </p:tav>
+                                        <p:tav tm="100000">
+                                          <p:val>
+                                            <p:strVal val="#ppt_x"/>
+                                          </p:val>
+                                        </p:tav>
+                                      </p:tavLst>
+                                    </p:anim>
+                                    <p:anim calcmode="lin" valueType="num">
+                                      <p:cBhvr>
+                                        <p:cTn id="103" dur="1000" fill="hold"/>
+                                        <p:tgtEl>
+                                          <p:spTgt spid="46"/>
+                                        </p:tgtEl>
+                                        <p:attrNameLst>
+                                          <p:attrName>ppt_y</p:attrName>
+                                        </p:attrNameLst>
+                                      </p:cBhvr>
+                                      <p:tavLst>
+                                        <p:tav tm="0">
+                                          <p:val>
+                                            <p:strVal val="#ppt_y+.1"/>
+                                          </p:val>
+                                        </p:tav>
+                                        <p:tav tm="100000">
+                                          <p:val>
+                                            <p:strVal val="#ppt_y"/>
+                                          </p:val>
+                                        </p:tav>
+                                      </p:tavLst>
+                                    </p:anim>
+                                  </p:childTnLst>
+                                </p:cTn>
+                              </p:par>
+                            </p:childTnLst>
+                          </p:cTn>
+                        </p:par>
+                      </p:childTnLst>
+                    </p:cTn>
+                  </p:par>
+                  <p:par>
+                    <p:cTn id="104" fill="hold">
+                      <p:stCondLst>
+                        <p:cond delay="indefinite"/>
+                      </p:stCondLst>
+                      <p:childTnLst>
+                        <p:par>
+                          <p:cTn id="105" fill="hold">
+                            <p:stCondLst>
+                              <p:cond delay="0"/>
+                            </p:stCondLst>
+                            <p:childTnLst>
+                              <p:par>
+                                <p:cTn id="106" presetID="42" presetClass="entr" presetSubtype="0" fill="hold" grpId="0" nodeType="clickEffect">
+                                  <p:stCondLst>
+                                    <p:cond delay="0"/>
+                                  </p:stCondLst>
+                                  <p:childTnLst>
+                                    <p:set>
+                                      <p:cBhvr>
+                                        <p:cTn id="107" dur="1" fill="hold">
+                                          <p:stCondLst>
+                                            <p:cond delay="0"/>
+                                          </p:stCondLst>
+                                        </p:cTn>
+                                        <p:tgtEl>
+                                          <p:spTgt spid="6"/>
+                                        </p:tgtEl>
+                                        <p:attrNameLst>
+                                          <p:attrName>style.visibility</p:attrName>
+                                        </p:attrNameLst>
+                                      </p:cBhvr>
+                                      <p:to>
+                                        <p:strVal val="visible"/>
+                                      </p:to>
+                                    </p:set>
+                                    <p:animEffect transition="in" filter="fade">
+                                      <p:cBhvr>
+                                        <p:cTn id="108" dur="1000"/>
+                                        <p:tgtEl>
+                                          <p:spTgt spid="6"/>
+                                        </p:tgtEl>
+                                      </p:cBhvr>
+                                    </p:animEffect>
+                                    <p:anim calcmode="lin" valueType="num">
+                                      <p:cBhvr>
+                                        <p:cTn id="109" dur="1000" fill="hold"/>
+                                        <p:tgtEl>
+                                          <p:spTgt spid="6"/>
+                                        </p:tgtEl>
+                                        <p:attrNameLst>
+                                          <p:attrName>ppt_x</p:attrName>
+                                        </p:attrNameLst>
+                                      </p:cBhvr>
+                                      <p:tavLst>
+                                        <p:tav tm="0">
+                                          <p:val>
+                                            <p:strVal val="#ppt_x"/>
+                                          </p:val>
+                                        </p:tav>
+                                        <p:tav tm="100000">
+                                          <p:val>
+                                            <p:strVal val="#ppt_x"/>
+                                          </p:val>
+                                        </p:tav>
+                                      </p:tavLst>
+                                    </p:anim>
+                                    <p:anim calcmode="lin" valueType="num">
+                                      <p:cBhvr>
+                                        <p:cTn id="110" dur="1000" fill="hold"/>
+                                        <p:tgtEl>
+                                          <p:spTgt spid="6"/>
+                                        </p:tgtEl>
+                                        <p:attrNameLst>
+                                          <p:attrName>ppt_y</p:attrName>
+                                        </p:attrNameLst>
+                                      </p:cBhvr>
+                                      <p:tavLst>
+                                        <p:tav tm="0">
+                                          <p:val>
+                                            <p:strVal val="#ppt_y+.1"/>
+                                          </p:val>
+                                        </p:tav>
+                                        <p:tav tm="100000">
+                                          <p:val>
+                                            <p:strVal val="#ppt_y"/>
+                                          </p:val>
+                                        </p:tav>
+                                      </p:tavLst>
+                                    </p:anim>
+                                  </p:childTnLst>
+                                </p:cTn>
+                              </p:par>
+                              <p:par>
+                                <p:cTn id="111" presetID="42" presetClass="entr" presetSubtype="0" fill="hold" grpId="0" nodeType="withEffect">
+                                  <p:stCondLst>
+                                    <p:cond delay="0"/>
+                                  </p:stCondLst>
+                                  <p:childTnLst>
+                                    <p:set>
+                                      <p:cBhvr>
+                                        <p:cTn id="112" dur="1" fill="hold">
+                                          <p:stCondLst>
+                                            <p:cond delay="0"/>
+                                          </p:stCondLst>
+                                        </p:cTn>
+                                        <p:tgtEl>
+                                          <p:spTgt spid="8"/>
+                                        </p:tgtEl>
+                                        <p:attrNameLst>
+                                          <p:attrName>style.visibility</p:attrName>
+                                        </p:attrNameLst>
+                                      </p:cBhvr>
+                                      <p:to>
+                                        <p:strVal val="visible"/>
+                                      </p:to>
+                                    </p:set>
+                                    <p:animEffect transition="in" filter="fade">
+                                      <p:cBhvr>
+                                        <p:cTn id="113" dur="1000"/>
+                                        <p:tgtEl>
+                                          <p:spTgt spid="8"/>
+                                        </p:tgtEl>
+                                      </p:cBhvr>
+                                    </p:animEffect>
+                                    <p:anim calcmode="lin" valueType="num">
+                                      <p:cBhvr>
+                                        <p:cTn id="114" dur="1000" fill="hold"/>
+                                        <p:tgtEl>
+                                          <p:spTgt spid="8"/>
+                                        </p:tgtEl>
+                                        <p:attrNameLst>
+                                          <p:attrName>ppt_x</p:attrName>
+                                        </p:attrNameLst>
+                                      </p:cBhvr>
+                                      <p:tavLst>
+                                        <p:tav tm="0">
+                                          <p:val>
+                                            <p:strVal val="#ppt_x"/>
+                                          </p:val>
+                                        </p:tav>
+                                        <p:tav tm="100000">
+                                          <p:val>
+                                            <p:strVal val="#ppt_x"/>
+                                          </p:val>
+                                        </p:tav>
+                                      </p:tavLst>
+                                    </p:anim>
+                                    <p:anim calcmode="lin" valueType="num">
+                                      <p:cBhvr>
+                                        <p:cTn id="115" dur="1000" fill="hold"/>
+                                        <p:tgtEl>
+                                          <p:spTgt spid="8"/>
+                                        </p:tgtEl>
+                                        <p:attrNameLst>
+                                          <p:attrName>ppt_y</p:attrName>
+                                        </p:attrNameLst>
+                                      </p:cBhvr>
+                                      <p:tavLst>
+                                        <p:tav tm="0">
+                                          <p:val>
+                                            <p:strVal val="#ppt_y+.1"/>
+                                          </p:val>
+                                        </p:tav>
+                                        <p:tav tm="100000">
+                                          <p:val>
+                                            <p:strVal val="#ppt_y"/>
+                                          </p:val>
+                                        </p:tav>
+                                      </p:tavLst>
+                                    </p:anim>
+                                  </p:childTnLst>
+                                </p:cTn>
+                              </p:par>
+                              <p:par>
+                                <p:cTn id="116" presetID="42" presetClass="entr" presetSubtype="0" fill="hold" grpId="0" nodeType="withEffect">
+                                  <p:stCondLst>
+                                    <p:cond delay="0"/>
+                                  </p:stCondLst>
+                                  <p:childTnLst>
+                                    <p:set>
+                                      <p:cBhvr>
+                                        <p:cTn id="117" dur="1" fill="hold">
+                                          <p:stCondLst>
+                                            <p:cond delay="0"/>
+                                          </p:stCondLst>
+                                        </p:cTn>
+                                        <p:tgtEl>
+                                          <p:spTgt spid="5"/>
+                                        </p:tgtEl>
+                                        <p:attrNameLst>
+                                          <p:attrName>style.visibility</p:attrName>
+                                        </p:attrNameLst>
+                                      </p:cBhvr>
+                                      <p:to>
+                                        <p:strVal val="visible"/>
+                                      </p:to>
+                                    </p:set>
+                                    <p:animEffect transition="in" filter="fade">
+                                      <p:cBhvr>
+                                        <p:cTn id="118" dur="1000"/>
+                                        <p:tgtEl>
+                                          <p:spTgt spid="5"/>
+                                        </p:tgtEl>
+                                      </p:cBhvr>
+                                    </p:animEffect>
+                                    <p:anim calcmode="lin" valueType="num">
+                                      <p:cBhvr>
+                                        <p:cTn id="119" dur="1000" fill="hold"/>
+                                        <p:tgtEl>
+                                          <p:spTgt spid="5"/>
+                                        </p:tgtEl>
+                                        <p:attrNameLst>
+                                          <p:attrName>ppt_x</p:attrName>
+                                        </p:attrNameLst>
+                                      </p:cBhvr>
+                                      <p:tavLst>
+                                        <p:tav tm="0">
+                                          <p:val>
+                                            <p:strVal val="#ppt_x"/>
+                                          </p:val>
+                                        </p:tav>
+                                        <p:tav tm="100000">
+                                          <p:val>
+                                            <p:strVal val="#ppt_x"/>
+                                          </p:val>
+                                        </p:tav>
+                                      </p:tavLst>
+                                    </p:anim>
+                                    <p:anim calcmode="lin" valueType="num">
+                                      <p:cBhvr>
+                                        <p:cTn id="120" dur="1000" fill="hold"/>
+                                        <p:tgtEl>
+                                          <p:spTgt spid="5"/>
+                                        </p:tgtEl>
+                                        <p:attrNameLst>
+                                          <p:attrName>ppt_y</p:attrName>
+                                        </p:attrNameLst>
+                                      </p:cBhvr>
+                                      <p:tavLst>
+                                        <p:tav tm="0">
+                                          <p:val>
+                                            <p:strVal val="#ppt_y+.1"/>
+                                          </p:val>
+                                        </p:tav>
+                                        <p:tav tm="100000">
+                                          <p:val>
+                                            <p:strVal val="#ppt_y"/>
+                                          </p:val>
+                                        </p:tav>
+                                      </p:tavLst>
+                                    </p:anim>
+                                  </p:childTnLst>
+                                </p:cTn>
+                              </p:par>
+                            </p:childTnLst>
+                          </p:cTn>
+                        </p:par>
+                      </p:childTnLst>
+                    </p:cTn>
+                  </p:par>
+                </p:childTnLst>
+              </p:cTn>
+              <p:prevCondLst>
+                <p:cond evt="onPrev" delay="0">
+                  <p:tgtEl>
+                    <p:sldTgt/>
+                  </p:tgtEl>
+                </p:cond>
+              </p:prevCondLst>
+              <p:nextCondLst>
+                <p:cond evt="onNext" delay="0">
+                  <p:tgtEl>
+                    <p:sldTgt/>
+                  </p:tgtEl>
+                </p:cond>
+              </p:nextCondLst>
+            </p:seq>
+          </p:childTnLst>
+        </p:cTn>
+      </p:par>
+    </p:tnLst>
+    <p:bldLst>
+      <p:bldP spid="42" grpId="0" animBg="1"/>
+      <p:bldP spid="43" grpId="0" animBg="1"/>
+      <p:bldP spid="44" grpId="0" animBg="1"/>
+      <p:bldP spid="45" grpId="0" animBg="1"/>
+      <p:bldP spid="46" grpId="0" animBg="1"/>
+      <p:bldP spid="47" grpId="0"/>
+      <p:bldP spid="48" grpId="0"/>
+      <p:bldP spid="49" grpId="0"/>
+      <p:bldP spid="50" grpId="0"/>
+      <p:bldP spid="51" grpId="0"/>
+      <p:bldP spid="52" grpId="0"/>
+      <p:bldP spid="53" grpId="0"/>
+      <p:bldP spid="54" grpId="0"/>
+      <p:bldP spid="55" grpId="0"/>
+      <p:bldP spid="56" grpId="0"/>
+      <p:bldP spid="57" grpId="0" animBg="1"/>
+      <p:bldP spid="59" grpId="0" animBg="1"/>
+      <p:bldP spid="5" grpId="0" animBg="1"/>
+      <p:bldP spid="6" grpId="0"/>
+      <p:bldP spid="8" grpId="0"/>
+    </p:bldLst>
+  </p:timing>
 </p:sld>
 </file>
 

</xml_diff>